<commit_message>
made week 1 ppt better.
</commit_message>
<xml_diff>
--- a/Week 1/AP CS A - Week 1 Lecture.pptx
+++ b/Week 1/AP CS A - Week 1 Lecture.pptx
@@ -5,7 +5,7 @@
     <p:sldMasterId id="2147483648" r:id="rId1"/>
   </p:sldMasterIdLst>
   <p:notesMasterIdLst>
-    <p:notesMasterId r:id="rId25"/>
+    <p:notesMasterId r:id="rId32"/>
   </p:notesMasterIdLst>
   <p:sldIdLst>
     <p:sldId id="256" r:id="rId2"/>
@@ -22,15 +22,22 @@
     <p:sldId id="266" r:id="rId13"/>
     <p:sldId id="267" r:id="rId14"/>
     <p:sldId id="277" r:id="rId15"/>
-    <p:sldId id="268" r:id="rId16"/>
-    <p:sldId id="269" r:id="rId17"/>
-    <p:sldId id="270" r:id="rId18"/>
-    <p:sldId id="271" r:id="rId19"/>
-    <p:sldId id="272" r:id="rId20"/>
-    <p:sldId id="273" r:id="rId21"/>
-    <p:sldId id="274" r:id="rId22"/>
-    <p:sldId id="275" r:id="rId23"/>
-    <p:sldId id="276" r:id="rId24"/>
+    <p:sldId id="279" r:id="rId16"/>
+    <p:sldId id="280" r:id="rId17"/>
+    <p:sldId id="281" r:id="rId18"/>
+    <p:sldId id="268" r:id="rId19"/>
+    <p:sldId id="269" r:id="rId20"/>
+    <p:sldId id="270" r:id="rId21"/>
+    <p:sldId id="271" r:id="rId22"/>
+    <p:sldId id="272" r:id="rId23"/>
+    <p:sldId id="273" r:id="rId24"/>
+    <p:sldId id="274" r:id="rId25"/>
+    <p:sldId id="275" r:id="rId26"/>
+    <p:sldId id="276" r:id="rId27"/>
+    <p:sldId id="282" r:id="rId28"/>
+    <p:sldId id="283" r:id="rId29"/>
+    <p:sldId id="284" r:id="rId30"/>
+    <p:sldId id="285" r:id="rId31"/>
   </p:sldIdLst>
   <p:sldSz cx="9144000" cy="5143500" type="screen16x9"/>
   <p:notesSz cx="6858000" cy="9144000"/>
@@ -214,7 +221,7 @@
           <a:p>
             <a:fld id="{F52C6709-C511-4DE8-ABD6-DB2E81FC1149}" type="datetimeFigureOut">
               <a:rPr lang="en-US" smtClean="0"/>
-              <a:t>8/27/2019</a:t>
+              <a:t>9/5/2019</a:t>
             </a:fld>
             <a:endParaRPr lang="en-US"/>
           </a:p>
@@ -671,7 +678,7 @@
           <a:p>
             <a:fld id="{DF13BD6C-D04E-4337-8BF8-D34DDB9F4393}" type="datetimeFigureOut">
               <a:rPr lang="en-US" smtClean="0"/>
-              <a:t>8/27/2019</a:t>
+              <a:t>9/5/2019</a:t>
             </a:fld>
             <a:endParaRPr lang="en-US"/>
           </a:p>
@@ -814,7 +821,7 @@
           <a:p>
             <a:fld id="{DF13BD6C-D04E-4337-8BF8-D34DDB9F4393}" type="datetimeFigureOut">
               <a:rPr lang="en-US" smtClean="0"/>
-              <a:t>8/27/2019</a:t>
+              <a:t>9/5/2019</a:t>
             </a:fld>
             <a:endParaRPr lang="en-US"/>
           </a:p>
@@ -1018,7 +1025,7 @@
           <a:p>
             <a:fld id="{DF13BD6C-D04E-4337-8BF8-D34DDB9F4393}" type="datetimeFigureOut">
               <a:rPr lang="en-US" smtClean="0"/>
-              <a:t>8/27/2019</a:t>
+              <a:t>9/5/2019</a:t>
             </a:fld>
             <a:endParaRPr lang="en-US"/>
           </a:p>
@@ -1405,7 +1412,7 @@
           <a:p>
             <a:fld id="{DF13BD6C-D04E-4337-8BF8-D34DDB9F4393}" type="datetimeFigureOut">
               <a:rPr lang="en-US" smtClean="0"/>
-              <a:t>8/27/2019</a:t>
+              <a:t>9/5/2019</a:t>
             </a:fld>
             <a:endParaRPr lang="en-US"/>
           </a:p>
@@ -1717,7 +1724,7 @@
           <a:p>
             <a:fld id="{DF13BD6C-D04E-4337-8BF8-D34DDB9F4393}" type="datetimeFigureOut">
               <a:rPr lang="en-US" smtClean="0"/>
-              <a:t>8/27/2019</a:t>
+              <a:t>9/5/2019</a:t>
             </a:fld>
             <a:endParaRPr lang="en-US"/>
           </a:p>
@@ -2168,7 +2175,7 @@
           <a:p>
             <a:fld id="{DF13BD6C-D04E-4337-8BF8-D34DDB9F4393}" type="datetimeFigureOut">
               <a:rPr lang="en-US" smtClean="0"/>
-              <a:t>8/27/2019</a:t>
+              <a:t>9/5/2019</a:t>
             </a:fld>
             <a:endParaRPr lang="en-US"/>
           </a:p>
@@ -2310,7 +2317,7 @@
           <a:p>
             <a:fld id="{DF13BD6C-D04E-4337-8BF8-D34DDB9F4393}" type="datetimeFigureOut">
               <a:rPr lang="en-US" smtClean="0"/>
-              <a:t>8/27/2019</a:t>
+              <a:t>9/5/2019</a:t>
             </a:fld>
             <a:endParaRPr lang="en-US"/>
           </a:p>
@@ -2429,7 +2436,7 @@
           <a:p>
             <a:fld id="{DF13BD6C-D04E-4337-8BF8-D34DDB9F4393}" type="datetimeFigureOut">
               <a:rPr lang="en-US" smtClean="0"/>
-              <a:t>8/27/2019</a:t>
+              <a:t>9/5/2019</a:t>
             </a:fld>
             <a:endParaRPr lang="en-US"/>
           </a:p>
@@ -2730,7 +2737,7 @@
           <a:p>
             <a:fld id="{DF13BD6C-D04E-4337-8BF8-D34DDB9F4393}" type="datetimeFigureOut">
               <a:rPr lang="en-US" smtClean="0"/>
-              <a:t>8/27/2019</a:t>
+              <a:t>9/5/2019</a:t>
             </a:fld>
             <a:endParaRPr lang="en-US"/>
           </a:p>
@@ -3007,7 +3014,7 @@
           <a:p>
             <a:fld id="{DF13BD6C-D04E-4337-8BF8-D34DDB9F4393}" type="datetimeFigureOut">
               <a:rPr lang="en-US" smtClean="0"/>
-              <a:t>8/27/2019</a:t>
+              <a:t>9/5/2019</a:t>
             </a:fld>
             <a:endParaRPr lang="en-US"/>
           </a:p>
@@ -4843,6 +4850,497 @@
 </file>
 
 <file path=ppt/slides/slide15.xml><?xml version="1.0" encoding="utf-8"?>
+<p:sld xmlns:a="http://schemas.openxmlformats.org/drawingml/2006/main" xmlns:r="http://schemas.openxmlformats.org/officeDocument/2006/relationships" xmlns:p="http://schemas.openxmlformats.org/presentationml/2006/main">
+  <p:cSld>
+    <p:spTree>
+      <p:nvGrpSpPr>
+        <p:cNvPr id="1" name=""/>
+        <p:cNvGrpSpPr/>
+        <p:nvPr/>
+      </p:nvGrpSpPr>
+      <p:grpSpPr>
+        <a:xfrm>
+          <a:off x="0" y="0"/>
+          <a:ext cx="0" cy="0"/>
+          <a:chOff x="0" y="0"/>
+          <a:chExt cx="0" cy="0"/>
+        </a:xfrm>
+      </p:grpSpPr>
+      <p:sp>
+        <p:nvSpPr>
+          <p:cNvPr id="2" name="Title 1"/>
+          <p:cNvSpPr>
+            <a:spLocks noGrp="1"/>
+          </p:cNvSpPr>
+          <p:nvPr>
+            <p:ph type="title"/>
+          </p:nvPr>
+        </p:nvSpPr>
+        <p:spPr/>
+        <p:txBody>
+          <a:bodyPr/>
+          <a:lstStyle/>
+          <a:p>
+            <a:r>
+              <a:rPr lang="en-US" dirty="0" smtClean="0"/>
+              <a:t>Exercise 1</a:t>
+            </a:r>
+            <a:endParaRPr lang="en-US" dirty="0"/>
+          </a:p>
+        </p:txBody>
+      </p:sp>
+      <p:sp>
+        <p:nvSpPr>
+          <p:cNvPr id="3" name="Content Placeholder 2"/>
+          <p:cNvSpPr>
+            <a:spLocks noGrp="1"/>
+          </p:cNvSpPr>
+          <p:nvPr>
+            <p:ph idx="1"/>
+          </p:nvPr>
+        </p:nvSpPr>
+        <p:spPr/>
+        <p:txBody>
+          <a:bodyPr>
+            <a:normAutofit/>
+          </a:bodyPr>
+          <a:lstStyle/>
+          <a:p>
+            <a:r>
+              <a:rPr lang="en-US" dirty="0" smtClean="0"/>
+              <a:t>Name</a:t>
+            </a:r>
+          </a:p>
+          <a:p>
+            <a:pPr lvl="1"/>
+            <a:r>
+              <a:rPr lang="en-US" dirty="0"/>
+              <a:t>Create a program that prints your name to the screen.</a:t>
+            </a:r>
+          </a:p>
+          <a:p>
+            <a:pPr lvl="1"/>
+            <a:r>
+              <a:rPr lang="en-US" dirty="0"/>
+              <a:t>The program output should resemble the </a:t>
+            </a:r>
+            <a:r>
+              <a:rPr lang="en-US" dirty="0" smtClean="0"/>
+              <a:t>following:</a:t>
+            </a:r>
+          </a:p>
+          <a:p>
+            <a:pPr marL="914400" lvl="2" indent="0">
+              <a:buNone/>
+            </a:pPr>
+            <a:endParaRPr lang="en-US" dirty="0"/>
+          </a:p>
+        </p:txBody>
+      </p:sp>
+      <p:sp>
+        <p:nvSpPr>
+          <p:cNvPr id="4" name="Rectangle 3"/>
+          <p:cNvSpPr/>
+          <p:nvPr/>
+        </p:nvSpPr>
+        <p:spPr>
+          <a:xfrm>
+            <a:off x="1685925" y="3648075"/>
+            <a:ext cx="5334000" cy="533400"/>
+          </a:xfrm>
+          <a:prstGeom prst="rect">
+            <a:avLst/>
+          </a:prstGeom>
+          <a:ln w="9525"/>
+        </p:spPr>
+        <p:style>
+          <a:lnRef idx="2">
+            <a:schemeClr val="dk1"/>
+          </a:lnRef>
+          <a:fillRef idx="1">
+            <a:schemeClr val="lt1"/>
+          </a:fillRef>
+          <a:effectRef idx="0">
+            <a:schemeClr val="dk1"/>
+          </a:effectRef>
+          <a:fontRef idx="minor">
+            <a:schemeClr val="dk1"/>
+          </a:fontRef>
+        </p:style>
+        <p:txBody>
+          <a:bodyPr rtlCol="0" anchor="ctr"/>
+          <a:lstStyle/>
+          <a:p>
+            <a:r>
+              <a:rPr lang="en-US" dirty="0" smtClean="0"/>
+              <a:t>Jane Doe</a:t>
+            </a:r>
+            <a:endParaRPr lang="en-US" dirty="0"/>
+          </a:p>
+        </p:txBody>
+      </p:sp>
+    </p:spTree>
+    <p:extLst>
+      <p:ext uri="{BB962C8B-B14F-4D97-AF65-F5344CB8AC3E}">
+        <p14:creationId xmlns:p14="http://schemas.microsoft.com/office/powerpoint/2010/main" val="751396992"/>
+      </p:ext>
+    </p:extLst>
+  </p:cSld>
+  <p:clrMapOvr>
+    <a:masterClrMapping/>
+  </p:clrMapOvr>
+  <p:timing>
+    <p:tnLst>
+      <p:par>
+        <p:cTn id="1" dur="indefinite" restart="never" nodeType="tmRoot"/>
+      </p:par>
+    </p:tnLst>
+  </p:timing>
+</p:sld>
+</file>
+
+<file path=ppt/slides/slide16.xml><?xml version="1.0" encoding="utf-8"?>
+<p:sld xmlns:a="http://schemas.openxmlformats.org/drawingml/2006/main" xmlns:r="http://schemas.openxmlformats.org/officeDocument/2006/relationships" xmlns:p="http://schemas.openxmlformats.org/presentationml/2006/main">
+  <p:cSld>
+    <p:spTree>
+      <p:nvGrpSpPr>
+        <p:cNvPr id="1" name=""/>
+        <p:cNvGrpSpPr/>
+        <p:nvPr/>
+      </p:nvGrpSpPr>
+      <p:grpSpPr>
+        <a:xfrm>
+          <a:off x="0" y="0"/>
+          <a:ext cx="0" cy="0"/>
+          <a:chOff x="0" y="0"/>
+          <a:chExt cx="0" cy="0"/>
+        </a:xfrm>
+      </p:grpSpPr>
+      <p:sp>
+        <p:nvSpPr>
+          <p:cNvPr id="2" name="Title 1"/>
+          <p:cNvSpPr>
+            <a:spLocks noGrp="1"/>
+          </p:cNvSpPr>
+          <p:nvPr>
+            <p:ph type="title"/>
+          </p:nvPr>
+        </p:nvSpPr>
+        <p:spPr/>
+        <p:txBody>
+          <a:bodyPr/>
+          <a:lstStyle/>
+          <a:p>
+            <a:r>
+              <a:rPr lang="en-US" dirty="0" smtClean="0"/>
+              <a:t>Exercise 2</a:t>
+            </a:r>
+            <a:endParaRPr lang="en-US" dirty="0"/>
+          </a:p>
+        </p:txBody>
+      </p:sp>
+      <p:sp>
+        <p:nvSpPr>
+          <p:cNvPr id="3" name="Content Placeholder 2"/>
+          <p:cNvSpPr>
+            <a:spLocks noGrp="1"/>
+          </p:cNvSpPr>
+          <p:nvPr>
+            <p:ph idx="1"/>
+          </p:nvPr>
+        </p:nvSpPr>
+        <p:spPr/>
+        <p:txBody>
+          <a:bodyPr>
+            <a:normAutofit/>
+          </a:bodyPr>
+          <a:lstStyle/>
+          <a:p>
+            <a:r>
+              <a:rPr lang="en-US" dirty="0" smtClean="0"/>
+              <a:t>Hello World!</a:t>
+            </a:r>
+          </a:p>
+          <a:p>
+            <a:pPr lvl="1"/>
+            <a:r>
+              <a:rPr lang="en-US" dirty="0"/>
+              <a:t>Create a program that prints out the following</a:t>
+            </a:r>
+            <a:r>
+              <a:rPr lang="en-US" dirty="0" smtClean="0"/>
+              <a:t>:</a:t>
+            </a:r>
+            <a:endParaRPr lang="en-US" dirty="0"/>
+          </a:p>
+        </p:txBody>
+      </p:sp>
+      <p:sp>
+        <p:nvSpPr>
+          <p:cNvPr id="4" name="Rectangle 3"/>
+          <p:cNvSpPr/>
+          <p:nvPr/>
+        </p:nvSpPr>
+        <p:spPr>
+          <a:xfrm>
+            <a:off x="1590675" y="2571750"/>
+            <a:ext cx="5334000" cy="762000"/>
+          </a:xfrm>
+          <a:prstGeom prst="rect">
+            <a:avLst/>
+          </a:prstGeom>
+          <a:ln w="9525"/>
+        </p:spPr>
+        <p:style>
+          <a:lnRef idx="2">
+            <a:schemeClr val="dk1"/>
+          </a:lnRef>
+          <a:fillRef idx="1">
+            <a:schemeClr val="lt1"/>
+          </a:fillRef>
+          <a:effectRef idx="0">
+            <a:schemeClr val="dk1"/>
+          </a:effectRef>
+          <a:fontRef idx="minor">
+            <a:schemeClr val="dk1"/>
+          </a:fontRef>
+        </p:style>
+        <p:txBody>
+          <a:bodyPr rtlCol="0" anchor="ctr"/>
+          <a:lstStyle/>
+          <a:p>
+            <a:r>
+              <a:rPr lang="en-US" dirty="0"/>
+              <a:t>Hello world! </a:t>
+            </a:r>
+            <a:endParaRPr lang="en-US" dirty="0" smtClean="0"/>
+          </a:p>
+          <a:p>
+            <a:r>
+              <a:rPr lang="en-US" dirty="0" smtClean="0"/>
+              <a:t>(</a:t>
+            </a:r>
+            <a:r>
+              <a:rPr lang="en-US" dirty="0"/>
+              <a:t>And all the people of the world)</a:t>
+            </a:r>
+          </a:p>
+        </p:txBody>
+      </p:sp>
+    </p:spTree>
+    <p:extLst>
+      <p:ext uri="{BB962C8B-B14F-4D97-AF65-F5344CB8AC3E}">
+        <p14:creationId xmlns:p14="http://schemas.microsoft.com/office/powerpoint/2010/main" val="4212199622"/>
+      </p:ext>
+    </p:extLst>
+  </p:cSld>
+  <p:clrMapOvr>
+    <a:masterClrMapping/>
+  </p:clrMapOvr>
+  <p:timing>
+    <p:tnLst>
+      <p:par>
+        <p:cTn id="1" dur="indefinite" restart="never" nodeType="tmRoot"/>
+      </p:par>
+    </p:tnLst>
+  </p:timing>
+</p:sld>
+</file>
+
+<file path=ppt/slides/slide17.xml><?xml version="1.0" encoding="utf-8"?>
+<p:sld xmlns:a="http://schemas.openxmlformats.org/drawingml/2006/main" xmlns:r="http://schemas.openxmlformats.org/officeDocument/2006/relationships" xmlns:p="http://schemas.openxmlformats.org/presentationml/2006/main">
+  <p:cSld>
+    <p:spTree>
+      <p:nvGrpSpPr>
+        <p:cNvPr id="1" name=""/>
+        <p:cNvGrpSpPr/>
+        <p:nvPr/>
+      </p:nvGrpSpPr>
+      <p:grpSpPr>
+        <a:xfrm>
+          <a:off x="0" y="0"/>
+          <a:ext cx="0" cy="0"/>
+          <a:chOff x="0" y="0"/>
+          <a:chExt cx="0" cy="0"/>
+        </a:xfrm>
+      </p:grpSpPr>
+      <p:sp>
+        <p:nvSpPr>
+          <p:cNvPr id="2" name="Title 1"/>
+          <p:cNvSpPr>
+            <a:spLocks noGrp="1"/>
+          </p:cNvSpPr>
+          <p:nvPr>
+            <p:ph type="title"/>
+          </p:nvPr>
+        </p:nvSpPr>
+        <p:spPr/>
+        <p:txBody>
+          <a:bodyPr/>
+          <a:lstStyle/>
+          <a:p>
+            <a:r>
+              <a:rPr lang="en-US" dirty="0" smtClean="0"/>
+              <a:t>Exercise 3</a:t>
+            </a:r>
+            <a:endParaRPr lang="en-US" dirty="0"/>
+          </a:p>
+        </p:txBody>
+      </p:sp>
+      <p:sp>
+        <p:nvSpPr>
+          <p:cNvPr id="3" name="Content Placeholder 2"/>
+          <p:cNvSpPr>
+            <a:spLocks noGrp="1"/>
+          </p:cNvSpPr>
+          <p:nvPr>
+            <p:ph idx="1"/>
+          </p:nvPr>
+        </p:nvSpPr>
+        <p:spPr/>
+        <p:txBody>
+          <a:bodyPr>
+            <a:normAutofit/>
+          </a:bodyPr>
+          <a:lstStyle/>
+          <a:p>
+            <a:r>
+              <a:rPr lang="en-US" dirty="0" smtClean="0"/>
+              <a:t>Spruce</a:t>
+            </a:r>
+          </a:p>
+          <a:p>
+            <a:pPr lvl="1"/>
+            <a:r>
+              <a:rPr lang="en-US" dirty="0"/>
+              <a:t>Create a program that prints the following:</a:t>
+            </a:r>
+          </a:p>
+          <a:p>
+            <a:pPr marL="0" indent="0">
+              <a:buNone/>
+            </a:pPr>
+            <a:endParaRPr lang="en-US" dirty="0"/>
+          </a:p>
+        </p:txBody>
+      </p:sp>
+      <p:sp>
+        <p:nvSpPr>
+          <p:cNvPr id="4" name="Rectangle 3"/>
+          <p:cNvSpPr/>
+          <p:nvPr/>
+        </p:nvSpPr>
+        <p:spPr>
+          <a:xfrm>
+            <a:off x="1600200" y="2419350"/>
+            <a:ext cx="5334000" cy="1676400"/>
+          </a:xfrm>
+          <a:prstGeom prst="rect">
+            <a:avLst/>
+          </a:prstGeom>
+          <a:ln w="9525"/>
+        </p:spPr>
+        <p:style>
+          <a:lnRef idx="2">
+            <a:schemeClr val="dk1"/>
+          </a:lnRef>
+          <a:fillRef idx="1">
+            <a:schemeClr val="lt1"/>
+          </a:fillRef>
+          <a:effectRef idx="0">
+            <a:schemeClr val="dk1"/>
+          </a:effectRef>
+          <a:fontRef idx="minor">
+            <a:schemeClr val="dk1"/>
+          </a:fontRef>
+        </p:style>
+        <p:txBody>
+          <a:bodyPr rtlCol="0" anchor="ctr"/>
+          <a:lstStyle/>
+          <a:p>
+            <a:r>
+              <a:rPr lang="en-US" dirty="0"/>
+              <a:t> </a:t>
+            </a:r>
+            <a:r>
+              <a:rPr lang="en-US" dirty="0" smtClean="0"/>
+              <a:t>       *</a:t>
+            </a:r>
+            <a:endParaRPr lang="en-US" dirty="0"/>
+          </a:p>
+          <a:p>
+            <a:r>
+              <a:rPr lang="en-US" dirty="0"/>
+              <a:t>   </a:t>
+            </a:r>
+            <a:r>
+              <a:rPr lang="en-US" dirty="0" smtClean="0"/>
+              <a:t>   ***</a:t>
+            </a:r>
+            <a:endParaRPr lang="en-US" dirty="0"/>
+          </a:p>
+          <a:p>
+            <a:r>
+              <a:rPr lang="en-US" dirty="0"/>
+              <a:t>  </a:t>
+            </a:r>
+            <a:r>
+              <a:rPr lang="en-US" dirty="0" smtClean="0"/>
+              <a:t>  *****</a:t>
+            </a:r>
+            <a:endParaRPr lang="en-US" dirty="0"/>
+          </a:p>
+          <a:p>
+            <a:r>
+              <a:rPr lang="en-US" dirty="0"/>
+              <a:t> </a:t>
+            </a:r>
+            <a:r>
+              <a:rPr lang="en-US" dirty="0" smtClean="0"/>
+              <a:t> *******</a:t>
+            </a:r>
+            <a:endParaRPr lang="en-US" dirty="0"/>
+          </a:p>
+          <a:p>
+            <a:r>
+              <a:rPr lang="en-US" dirty="0"/>
+              <a:t>*********</a:t>
+            </a:r>
+          </a:p>
+          <a:p>
+            <a:r>
+              <a:rPr lang="en-US" dirty="0"/>
+              <a:t>    </a:t>
+            </a:r>
+            <a:r>
+              <a:rPr lang="en-US" dirty="0" smtClean="0"/>
+              <a:t>     *</a:t>
+            </a:r>
+            <a:endParaRPr lang="en-US" dirty="0"/>
+          </a:p>
+        </p:txBody>
+      </p:sp>
+    </p:spTree>
+    <p:extLst>
+      <p:ext uri="{BB962C8B-B14F-4D97-AF65-F5344CB8AC3E}">
+        <p14:creationId xmlns:p14="http://schemas.microsoft.com/office/powerpoint/2010/main" val="1988232961"/>
+      </p:ext>
+    </p:extLst>
+  </p:cSld>
+  <p:clrMapOvr>
+    <a:masterClrMapping/>
+  </p:clrMapOvr>
+  <p:timing>
+    <p:tnLst>
+      <p:par>
+        <p:cTn id="1" dur="indefinite" restart="never" nodeType="tmRoot"/>
+      </p:par>
+    </p:tnLst>
+  </p:timing>
+</p:sld>
+</file>
+
+<file path=ppt/slides/slide18.xml><?xml version="1.0" encoding="utf-8"?>
 <p:sld xmlns:a="http://schemas.openxmlformats.org/drawingml/2006/main" xmlns:r="http://schemas.openxmlformats.org/officeDocument/2006/relationships" xmlns:p="http://schemas.openxmlformats.org/presentationml/2006/main">
   <p:cSld>
     <p:spTree>
@@ -5383,7 +5881,7 @@
 </p:sld>
 </file>
 
-<file path=ppt/slides/slide16.xml><?xml version="1.0" encoding="utf-8"?>
+<file path=ppt/slides/slide19.xml><?xml version="1.0" encoding="utf-8"?>
 <p:sld xmlns:a="http://schemas.openxmlformats.org/drawingml/2006/main" xmlns:r="http://schemas.openxmlformats.org/officeDocument/2006/relationships" xmlns:p="http://schemas.openxmlformats.org/presentationml/2006/main">
   <p:cSld>
     <p:spTree>
@@ -5722,794 +6220,6 @@
                                           <p:spTgt spid="3">
                                             <p:txEl>
                                               <p:pRg st="3" end="3"/>
-                                            </p:txEl>
-                                          </p:spTgt>
-                                        </p:tgtEl>
-                                      </p:cBhvr>
-                                    </p:animEffect>
-                                  </p:childTnLst>
-                                </p:cTn>
-                              </p:par>
-                            </p:childTnLst>
-                          </p:cTn>
-                        </p:par>
-                      </p:childTnLst>
-                    </p:cTn>
-                  </p:par>
-                </p:childTnLst>
-              </p:cTn>
-              <p:prevCondLst>
-                <p:cond evt="onPrev" delay="0">
-                  <p:tgtEl>
-                    <p:sldTgt/>
-                  </p:tgtEl>
-                </p:cond>
-              </p:prevCondLst>
-              <p:nextCondLst>
-                <p:cond evt="onNext" delay="0">
-                  <p:tgtEl>
-                    <p:sldTgt/>
-                  </p:tgtEl>
-                </p:cond>
-              </p:nextCondLst>
-            </p:seq>
-          </p:childTnLst>
-        </p:cTn>
-      </p:par>
-    </p:tnLst>
-  </p:timing>
-</p:sld>
-</file>
-
-<file path=ppt/slides/slide17.xml><?xml version="1.0" encoding="utf-8"?>
-<p:sld xmlns:a="http://schemas.openxmlformats.org/drawingml/2006/main" xmlns:r="http://schemas.openxmlformats.org/officeDocument/2006/relationships" xmlns:p="http://schemas.openxmlformats.org/presentationml/2006/main">
-  <p:cSld>
-    <p:spTree>
-      <p:nvGrpSpPr>
-        <p:cNvPr id="1" name=""/>
-        <p:cNvGrpSpPr/>
-        <p:nvPr/>
-      </p:nvGrpSpPr>
-      <p:grpSpPr>
-        <a:xfrm>
-          <a:off x="0" y="0"/>
-          <a:ext cx="0" cy="0"/>
-          <a:chOff x="0" y="0"/>
-          <a:chExt cx="0" cy="0"/>
-        </a:xfrm>
-      </p:grpSpPr>
-      <p:sp>
-        <p:nvSpPr>
-          <p:cNvPr id="2" name="Title 1"/>
-          <p:cNvSpPr>
-            <a:spLocks noGrp="1"/>
-          </p:cNvSpPr>
-          <p:nvPr>
-            <p:ph type="title"/>
-          </p:nvPr>
-        </p:nvSpPr>
-        <p:spPr/>
-        <p:txBody>
-          <a:bodyPr/>
-          <a:lstStyle/>
-          <a:p>
-            <a:r>
-              <a:rPr lang="en-US" dirty="0" smtClean="0"/>
-              <a:t>Calculation</a:t>
-            </a:r>
-            <a:endParaRPr lang="en-US" dirty="0"/>
-          </a:p>
-        </p:txBody>
-      </p:sp>
-      <p:sp>
-        <p:nvSpPr>
-          <p:cNvPr id="3" name="Content Placeholder 2"/>
-          <p:cNvSpPr>
-            <a:spLocks noGrp="1"/>
-          </p:cNvSpPr>
-          <p:nvPr>
-            <p:ph idx="1"/>
-          </p:nvPr>
-        </p:nvSpPr>
-        <p:spPr/>
-        <p:txBody>
-          <a:bodyPr>
-            <a:normAutofit/>
-          </a:bodyPr>
-          <a:lstStyle/>
-          <a:p>
-            <a:r>
-              <a:rPr lang="en-US" sz="2400" dirty="0"/>
-              <a:t>The calculation operations are pretty straightforward: +, -, * and </a:t>
-            </a:r>
-            <a:r>
-              <a:rPr lang="en-US" sz="2400" dirty="0" smtClean="0"/>
-              <a:t>/.</a:t>
-            </a:r>
-          </a:p>
-          <a:p>
-            <a:r>
-              <a:rPr lang="en-US" sz="2400" dirty="0"/>
-              <a:t>A more peculiar operation is the modulo operation %, which calculates the remainder of a division</a:t>
-            </a:r>
-            <a:r>
-              <a:rPr lang="en-US" sz="2400" dirty="0" smtClean="0"/>
-              <a:t>.</a:t>
-            </a:r>
-          </a:p>
-          <a:p>
-            <a:r>
-              <a:rPr lang="en-US" sz="2400" dirty="0"/>
-              <a:t>The order of operations is also pretty straightforward: the operations are calculated from left to right taking the parentheses into account.</a:t>
-            </a:r>
-          </a:p>
-        </p:txBody>
-      </p:sp>
-    </p:spTree>
-    <p:extLst>
-      <p:ext uri="{BB962C8B-B14F-4D97-AF65-F5344CB8AC3E}">
-        <p14:creationId xmlns:p14="http://schemas.microsoft.com/office/powerpoint/2010/main" val="2511286958"/>
-      </p:ext>
-    </p:extLst>
-  </p:cSld>
-  <p:clrMapOvr>
-    <a:masterClrMapping/>
-  </p:clrMapOvr>
-  <p:timing>
-    <p:tnLst>
-      <p:par>
-        <p:cTn id="1" dur="indefinite" restart="never" nodeType="tmRoot">
-          <p:childTnLst>
-            <p:seq concurrent="1" nextAc="seek">
-              <p:cTn id="2" dur="indefinite" nodeType="mainSeq">
-                <p:childTnLst>
-                  <p:par>
-                    <p:cTn id="3" fill="hold">
-                      <p:stCondLst>
-                        <p:cond delay="indefinite"/>
-                      </p:stCondLst>
-                      <p:childTnLst>
-                        <p:par>
-                          <p:cTn id="4" fill="hold">
-                            <p:stCondLst>
-                              <p:cond delay="0"/>
-                            </p:stCondLst>
-                            <p:childTnLst>
-                              <p:par>
-                                <p:cTn id="5" presetID="10" presetClass="entr" presetSubtype="0" fill="hold" nodeType="clickEffect">
-                                  <p:stCondLst>
-                                    <p:cond delay="0"/>
-                                  </p:stCondLst>
-                                  <p:childTnLst>
-                                    <p:set>
-                                      <p:cBhvr>
-                                        <p:cTn id="6" dur="1" fill="hold">
-                                          <p:stCondLst>
-                                            <p:cond delay="0"/>
-                                          </p:stCondLst>
-                                        </p:cTn>
-                                        <p:tgtEl>
-                                          <p:spTgt spid="3">
-                                            <p:txEl>
-                                              <p:pRg st="0" end="0"/>
-                                            </p:txEl>
-                                          </p:spTgt>
-                                        </p:tgtEl>
-                                        <p:attrNameLst>
-                                          <p:attrName>style.visibility</p:attrName>
-                                        </p:attrNameLst>
-                                      </p:cBhvr>
-                                      <p:to>
-                                        <p:strVal val="visible"/>
-                                      </p:to>
-                                    </p:set>
-                                    <p:animEffect transition="in" filter="fade">
-                                      <p:cBhvr>
-                                        <p:cTn id="7" dur="500"/>
-                                        <p:tgtEl>
-                                          <p:spTgt spid="3">
-                                            <p:txEl>
-                                              <p:pRg st="0" end="0"/>
-                                            </p:txEl>
-                                          </p:spTgt>
-                                        </p:tgtEl>
-                                      </p:cBhvr>
-                                    </p:animEffect>
-                                  </p:childTnLst>
-                                </p:cTn>
-                              </p:par>
-                            </p:childTnLst>
-                          </p:cTn>
-                        </p:par>
-                      </p:childTnLst>
-                    </p:cTn>
-                  </p:par>
-                  <p:par>
-                    <p:cTn id="8" fill="hold">
-                      <p:stCondLst>
-                        <p:cond delay="indefinite"/>
-                      </p:stCondLst>
-                      <p:childTnLst>
-                        <p:par>
-                          <p:cTn id="9" fill="hold">
-                            <p:stCondLst>
-                              <p:cond delay="0"/>
-                            </p:stCondLst>
-                            <p:childTnLst>
-                              <p:par>
-                                <p:cTn id="10" presetID="10" presetClass="entr" presetSubtype="0" fill="hold" nodeType="clickEffect">
-                                  <p:stCondLst>
-                                    <p:cond delay="0"/>
-                                  </p:stCondLst>
-                                  <p:childTnLst>
-                                    <p:set>
-                                      <p:cBhvr>
-                                        <p:cTn id="11" dur="1" fill="hold">
-                                          <p:stCondLst>
-                                            <p:cond delay="0"/>
-                                          </p:stCondLst>
-                                        </p:cTn>
-                                        <p:tgtEl>
-                                          <p:spTgt spid="3">
-                                            <p:txEl>
-                                              <p:pRg st="1" end="1"/>
-                                            </p:txEl>
-                                          </p:spTgt>
-                                        </p:tgtEl>
-                                        <p:attrNameLst>
-                                          <p:attrName>style.visibility</p:attrName>
-                                        </p:attrNameLst>
-                                      </p:cBhvr>
-                                      <p:to>
-                                        <p:strVal val="visible"/>
-                                      </p:to>
-                                    </p:set>
-                                    <p:animEffect transition="in" filter="fade">
-                                      <p:cBhvr>
-                                        <p:cTn id="12" dur="500"/>
-                                        <p:tgtEl>
-                                          <p:spTgt spid="3">
-                                            <p:txEl>
-                                              <p:pRg st="1" end="1"/>
-                                            </p:txEl>
-                                          </p:spTgt>
-                                        </p:tgtEl>
-                                      </p:cBhvr>
-                                    </p:animEffect>
-                                  </p:childTnLst>
-                                </p:cTn>
-                              </p:par>
-                            </p:childTnLst>
-                          </p:cTn>
-                        </p:par>
-                      </p:childTnLst>
-                    </p:cTn>
-                  </p:par>
-                  <p:par>
-                    <p:cTn id="13" fill="hold">
-                      <p:stCondLst>
-                        <p:cond delay="indefinite"/>
-                      </p:stCondLst>
-                      <p:childTnLst>
-                        <p:par>
-                          <p:cTn id="14" fill="hold">
-                            <p:stCondLst>
-                              <p:cond delay="0"/>
-                            </p:stCondLst>
-                            <p:childTnLst>
-                              <p:par>
-                                <p:cTn id="15" presetID="10" presetClass="entr" presetSubtype="0" fill="hold" nodeType="clickEffect">
-                                  <p:stCondLst>
-                                    <p:cond delay="0"/>
-                                  </p:stCondLst>
-                                  <p:childTnLst>
-                                    <p:set>
-                                      <p:cBhvr>
-                                        <p:cTn id="16" dur="1" fill="hold">
-                                          <p:stCondLst>
-                                            <p:cond delay="0"/>
-                                          </p:stCondLst>
-                                        </p:cTn>
-                                        <p:tgtEl>
-                                          <p:spTgt spid="3">
-                                            <p:txEl>
-                                              <p:pRg st="2" end="2"/>
-                                            </p:txEl>
-                                          </p:spTgt>
-                                        </p:tgtEl>
-                                        <p:attrNameLst>
-                                          <p:attrName>style.visibility</p:attrName>
-                                        </p:attrNameLst>
-                                      </p:cBhvr>
-                                      <p:to>
-                                        <p:strVal val="visible"/>
-                                      </p:to>
-                                    </p:set>
-                                    <p:animEffect transition="in" filter="fade">
-                                      <p:cBhvr>
-                                        <p:cTn id="17" dur="500"/>
-                                        <p:tgtEl>
-                                          <p:spTgt spid="3">
-                                            <p:txEl>
-                                              <p:pRg st="2" end="2"/>
-                                            </p:txEl>
-                                          </p:spTgt>
-                                        </p:tgtEl>
-                                      </p:cBhvr>
-                                    </p:animEffect>
-                                  </p:childTnLst>
-                                </p:cTn>
-                              </p:par>
-                            </p:childTnLst>
-                          </p:cTn>
-                        </p:par>
-                      </p:childTnLst>
-                    </p:cTn>
-                  </p:par>
-                </p:childTnLst>
-              </p:cTn>
-              <p:prevCondLst>
-                <p:cond evt="onPrev" delay="0">
-                  <p:tgtEl>
-                    <p:sldTgt/>
-                  </p:tgtEl>
-                </p:cond>
-              </p:prevCondLst>
-              <p:nextCondLst>
-                <p:cond evt="onNext" delay="0">
-                  <p:tgtEl>
-                    <p:sldTgt/>
-                  </p:tgtEl>
-                </p:cond>
-              </p:nextCondLst>
-            </p:seq>
-          </p:childTnLst>
-        </p:cTn>
-      </p:par>
-    </p:tnLst>
-  </p:timing>
-</p:sld>
-</file>
-
-<file path=ppt/slides/slide18.xml><?xml version="1.0" encoding="utf-8"?>
-<p:sld xmlns:a="http://schemas.openxmlformats.org/drawingml/2006/main" xmlns:r="http://schemas.openxmlformats.org/officeDocument/2006/relationships" xmlns:p="http://schemas.openxmlformats.org/presentationml/2006/main">
-  <p:cSld>
-    <p:spTree>
-      <p:nvGrpSpPr>
-        <p:cNvPr id="1" name=""/>
-        <p:cNvGrpSpPr/>
-        <p:nvPr/>
-      </p:nvGrpSpPr>
-      <p:grpSpPr>
-        <a:xfrm>
-          <a:off x="0" y="0"/>
-          <a:ext cx="0" cy="0"/>
-          <a:chOff x="0" y="0"/>
-          <a:chExt cx="0" cy="0"/>
-        </a:xfrm>
-      </p:grpSpPr>
-      <p:sp>
-        <p:nvSpPr>
-          <p:cNvPr id="2" name="Title 1"/>
-          <p:cNvSpPr>
-            <a:spLocks noGrp="1"/>
-          </p:cNvSpPr>
-          <p:nvPr>
-            <p:ph type="title"/>
-          </p:nvPr>
-        </p:nvSpPr>
-        <p:spPr/>
-        <p:txBody>
-          <a:bodyPr/>
-          <a:lstStyle/>
-          <a:p>
-            <a:r>
-              <a:rPr lang="en-US" dirty="0" smtClean="0"/>
-              <a:t>Floating point numbers</a:t>
-            </a:r>
-            <a:endParaRPr lang="en-US" dirty="0"/>
-          </a:p>
-        </p:txBody>
-      </p:sp>
-      <p:sp>
-        <p:nvSpPr>
-          <p:cNvPr id="3" name="Content Placeholder 2"/>
-          <p:cNvSpPr>
-            <a:spLocks noGrp="1"/>
-          </p:cNvSpPr>
-          <p:nvPr>
-            <p:ph idx="1"/>
-          </p:nvPr>
-        </p:nvSpPr>
-        <p:spPr/>
-        <p:txBody>
-          <a:bodyPr>
-            <a:normAutofit/>
-          </a:bodyPr>
-          <a:lstStyle/>
-          <a:p>
-            <a:r>
-              <a:rPr lang="en-US" sz="2800" dirty="0"/>
-              <a:t>Calculating the division and remainder of whole numbers is a little trickier</a:t>
-            </a:r>
-            <a:r>
-              <a:rPr lang="en-US" sz="2800" dirty="0" smtClean="0"/>
-              <a:t>.</a:t>
-            </a:r>
-          </a:p>
-          <a:p>
-            <a:r>
-              <a:rPr lang="en-US" sz="2800" dirty="0"/>
-              <a:t>A floating point number (decimal number) and integer (whole number) often get mixed up</a:t>
-            </a:r>
-            <a:r>
-              <a:rPr lang="en-US" sz="2800" dirty="0" smtClean="0"/>
-              <a:t>.</a:t>
-            </a:r>
-          </a:p>
-          <a:p>
-            <a:r>
-              <a:rPr lang="en-US" sz="2800" dirty="0"/>
-              <a:t>If all the variables in a calculation operation are integers, the end result will also be an integer.</a:t>
-            </a:r>
-          </a:p>
-        </p:txBody>
-      </p:sp>
-    </p:spTree>
-    <p:extLst>
-      <p:ext uri="{BB962C8B-B14F-4D97-AF65-F5344CB8AC3E}">
-        <p14:creationId xmlns:p14="http://schemas.microsoft.com/office/powerpoint/2010/main" val="1719028210"/>
-      </p:ext>
-    </p:extLst>
-  </p:cSld>
-  <p:clrMapOvr>
-    <a:masterClrMapping/>
-  </p:clrMapOvr>
-  <p:timing>
-    <p:tnLst>
-      <p:par>
-        <p:cTn id="1" dur="indefinite" restart="never" nodeType="tmRoot">
-          <p:childTnLst>
-            <p:seq concurrent="1" nextAc="seek">
-              <p:cTn id="2" dur="indefinite" nodeType="mainSeq">
-                <p:childTnLst>
-                  <p:par>
-                    <p:cTn id="3" fill="hold">
-                      <p:stCondLst>
-                        <p:cond delay="indefinite"/>
-                      </p:stCondLst>
-                      <p:childTnLst>
-                        <p:par>
-                          <p:cTn id="4" fill="hold">
-                            <p:stCondLst>
-                              <p:cond delay="0"/>
-                            </p:stCondLst>
-                            <p:childTnLst>
-                              <p:par>
-                                <p:cTn id="5" presetID="10" presetClass="entr" presetSubtype="0" fill="hold" nodeType="clickEffect">
-                                  <p:stCondLst>
-                                    <p:cond delay="0"/>
-                                  </p:stCondLst>
-                                  <p:childTnLst>
-                                    <p:set>
-                                      <p:cBhvr>
-                                        <p:cTn id="6" dur="1" fill="hold">
-                                          <p:stCondLst>
-                                            <p:cond delay="0"/>
-                                          </p:stCondLst>
-                                        </p:cTn>
-                                        <p:tgtEl>
-                                          <p:spTgt spid="3">
-                                            <p:txEl>
-                                              <p:pRg st="0" end="0"/>
-                                            </p:txEl>
-                                          </p:spTgt>
-                                        </p:tgtEl>
-                                        <p:attrNameLst>
-                                          <p:attrName>style.visibility</p:attrName>
-                                        </p:attrNameLst>
-                                      </p:cBhvr>
-                                      <p:to>
-                                        <p:strVal val="visible"/>
-                                      </p:to>
-                                    </p:set>
-                                    <p:animEffect transition="in" filter="fade">
-                                      <p:cBhvr>
-                                        <p:cTn id="7" dur="500"/>
-                                        <p:tgtEl>
-                                          <p:spTgt spid="3">
-                                            <p:txEl>
-                                              <p:pRg st="0" end="0"/>
-                                            </p:txEl>
-                                          </p:spTgt>
-                                        </p:tgtEl>
-                                      </p:cBhvr>
-                                    </p:animEffect>
-                                  </p:childTnLst>
-                                </p:cTn>
-                              </p:par>
-                            </p:childTnLst>
-                          </p:cTn>
-                        </p:par>
-                      </p:childTnLst>
-                    </p:cTn>
-                  </p:par>
-                  <p:par>
-                    <p:cTn id="8" fill="hold">
-                      <p:stCondLst>
-                        <p:cond delay="indefinite"/>
-                      </p:stCondLst>
-                      <p:childTnLst>
-                        <p:par>
-                          <p:cTn id="9" fill="hold">
-                            <p:stCondLst>
-                              <p:cond delay="0"/>
-                            </p:stCondLst>
-                            <p:childTnLst>
-                              <p:par>
-                                <p:cTn id="10" presetID="10" presetClass="entr" presetSubtype="0" fill="hold" nodeType="clickEffect">
-                                  <p:stCondLst>
-                                    <p:cond delay="0"/>
-                                  </p:stCondLst>
-                                  <p:childTnLst>
-                                    <p:set>
-                                      <p:cBhvr>
-                                        <p:cTn id="11" dur="1" fill="hold">
-                                          <p:stCondLst>
-                                            <p:cond delay="0"/>
-                                          </p:stCondLst>
-                                        </p:cTn>
-                                        <p:tgtEl>
-                                          <p:spTgt spid="3">
-                                            <p:txEl>
-                                              <p:pRg st="1" end="1"/>
-                                            </p:txEl>
-                                          </p:spTgt>
-                                        </p:tgtEl>
-                                        <p:attrNameLst>
-                                          <p:attrName>style.visibility</p:attrName>
-                                        </p:attrNameLst>
-                                      </p:cBhvr>
-                                      <p:to>
-                                        <p:strVal val="visible"/>
-                                      </p:to>
-                                    </p:set>
-                                    <p:animEffect transition="in" filter="fade">
-                                      <p:cBhvr>
-                                        <p:cTn id="12" dur="500"/>
-                                        <p:tgtEl>
-                                          <p:spTgt spid="3">
-                                            <p:txEl>
-                                              <p:pRg st="1" end="1"/>
-                                            </p:txEl>
-                                          </p:spTgt>
-                                        </p:tgtEl>
-                                      </p:cBhvr>
-                                    </p:animEffect>
-                                  </p:childTnLst>
-                                </p:cTn>
-                              </p:par>
-                            </p:childTnLst>
-                          </p:cTn>
-                        </p:par>
-                      </p:childTnLst>
-                    </p:cTn>
-                  </p:par>
-                  <p:par>
-                    <p:cTn id="13" fill="hold">
-                      <p:stCondLst>
-                        <p:cond delay="indefinite"/>
-                      </p:stCondLst>
-                      <p:childTnLst>
-                        <p:par>
-                          <p:cTn id="14" fill="hold">
-                            <p:stCondLst>
-                              <p:cond delay="0"/>
-                            </p:stCondLst>
-                            <p:childTnLst>
-                              <p:par>
-                                <p:cTn id="15" presetID="10" presetClass="entr" presetSubtype="0" fill="hold" nodeType="clickEffect">
-                                  <p:stCondLst>
-                                    <p:cond delay="0"/>
-                                  </p:stCondLst>
-                                  <p:childTnLst>
-                                    <p:set>
-                                      <p:cBhvr>
-                                        <p:cTn id="16" dur="1" fill="hold">
-                                          <p:stCondLst>
-                                            <p:cond delay="0"/>
-                                          </p:stCondLst>
-                                        </p:cTn>
-                                        <p:tgtEl>
-                                          <p:spTgt spid="3">
-                                            <p:txEl>
-                                              <p:pRg st="2" end="2"/>
-                                            </p:txEl>
-                                          </p:spTgt>
-                                        </p:tgtEl>
-                                        <p:attrNameLst>
-                                          <p:attrName>style.visibility</p:attrName>
-                                        </p:attrNameLst>
-                                      </p:cBhvr>
-                                      <p:to>
-                                        <p:strVal val="visible"/>
-                                      </p:to>
-                                    </p:set>
-                                    <p:animEffect transition="in" filter="fade">
-                                      <p:cBhvr>
-                                        <p:cTn id="17" dur="500"/>
-                                        <p:tgtEl>
-                                          <p:spTgt spid="3">
-                                            <p:txEl>
-                                              <p:pRg st="2" end="2"/>
-                                            </p:txEl>
-                                          </p:spTgt>
-                                        </p:tgtEl>
-                                      </p:cBhvr>
-                                    </p:animEffect>
-                                  </p:childTnLst>
-                                </p:cTn>
-                              </p:par>
-                            </p:childTnLst>
-                          </p:cTn>
-                        </p:par>
-                      </p:childTnLst>
-                    </p:cTn>
-                  </p:par>
-                </p:childTnLst>
-              </p:cTn>
-              <p:prevCondLst>
-                <p:cond evt="onPrev" delay="0">
-                  <p:tgtEl>
-                    <p:sldTgt/>
-                  </p:tgtEl>
-                </p:cond>
-              </p:prevCondLst>
-              <p:nextCondLst>
-                <p:cond evt="onNext" delay="0">
-                  <p:tgtEl>
-                    <p:sldTgt/>
-                  </p:tgtEl>
-                </p:cond>
-              </p:nextCondLst>
-            </p:seq>
-          </p:childTnLst>
-        </p:cTn>
-      </p:par>
-    </p:tnLst>
-  </p:timing>
-</p:sld>
-</file>
-
-<file path=ppt/slides/slide19.xml><?xml version="1.0" encoding="utf-8"?>
-<p:sld xmlns:a="http://schemas.openxmlformats.org/drawingml/2006/main" xmlns:r="http://schemas.openxmlformats.org/officeDocument/2006/relationships" xmlns:p="http://schemas.openxmlformats.org/presentationml/2006/main">
-  <p:cSld>
-    <p:spTree>
-      <p:nvGrpSpPr>
-        <p:cNvPr id="1" name=""/>
-        <p:cNvGrpSpPr/>
-        <p:nvPr/>
-      </p:nvGrpSpPr>
-      <p:grpSpPr>
-        <a:xfrm>
-          <a:off x="0" y="0"/>
-          <a:ext cx="0" cy="0"/>
-          <a:chOff x="0" y="0"/>
-          <a:chExt cx="0" cy="0"/>
-        </a:xfrm>
-      </p:grpSpPr>
-      <p:sp>
-        <p:nvSpPr>
-          <p:cNvPr id="2" name="Title 1"/>
-          <p:cNvSpPr>
-            <a:spLocks noGrp="1"/>
-          </p:cNvSpPr>
-          <p:nvPr>
-            <p:ph type="title"/>
-          </p:nvPr>
-        </p:nvSpPr>
-        <p:spPr/>
-        <p:txBody>
-          <a:bodyPr/>
-          <a:lstStyle/>
-          <a:p>
-            <a:r>
-              <a:rPr lang="en-US" dirty="0" smtClean="0"/>
-              <a:t>Concatenation</a:t>
-            </a:r>
-            <a:endParaRPr lang="en-US" dirty="0"/>
-          </a:p>
-        </p:txBody>
-      </p:sp>
-      <p:sp>
-        <p:nvSpPr>
-          <p:cNvPr id="3" name="Content Placeholder 2"/>
-          <p:cNvSpPr>
-            <a:spLocks noGrp="1"/>
-          </p:cNvSpPr>
-          <p:nvPr>
-            <p:ph idx="1"/>
-          </p:nvPr>
-        </p:nvSpPr>
-        <p:spPr/>
-        <p:txBody>
-          <a:bodyPr>
-            <a:normAutofit/>
-          </a:bodyPr>
-          <a:lstStyle/>
-          <a:p>
-            <a:r>
-              <a:rPr lang="en-US" sz="2800" dirty="0"/>
-              <a:t>If the + operator is used between two strings, a new string is created with the two strings combined.</a:t>
-            </a:r>
-          </a:p>
-        </p:txBody>
-      </p:sp>
-    </p:spTree>
-    <p:extLst>
-      <p:ext uri="{BB962C8B-B14F-4D97-AF65-F5344CB8AC3E}">
-        <p14:creationId xmlns:p14="http://schemas.microsoft.com/office/powerpoint/2010/main" val="3269883544"/>
-      </p:ext>
-    </p:extLst>
-  </p:cSld>
-  <p:clrMapOvr>
-    <a:masterClrMapping/>
-  </p:clrMapOvr>
-  <p:timing>
-    <p:tnLst>
-      <p:par>
-        <p:cTn id="1" dur="indefinite" restart="never" nodeType="tmRoot">
-          <p:childTnLst>
-            <p:seq concurrent="1" nextAc="seek">
-              <p:cTn id="2" dur="indefinite" nodeType="mainSeq">
-                <p:childTnLst>
-                  <p:par>
-                    <p:cTn id="3" fill="hold">
-                      <p:stCondLst>
-                        <p:cond delay="indefinite"/>
-                      </p:stCondLst>
-                      <p:childTnLst>
-                        <p:par>
-                          <p:cTn id="4" fill="hold">
-                            <p:stCondLst>
-                              <p:cond delay="0"/>
-                            </p:stCondLst>
-                            <p:childTnLst>
-                              <p:par>
-                                <p:cTn id="5" presetID="10" presetClass="entr" presetSubtype="0" fill="hold" nodeType="clickEffect">
-                                  <p:stCondLst>
-                                    <p:cond delay="0"/>
-                                  </p:stCondLst>
-                                  <p:childTnLst>
-                                    <p:set>
-                                      <p:cBhvr>
-                                        <p:cTn id="6" dur="1" fill="hold">
-                                          <p:stCondLst>
-                                            <p:cond delay="0"/>
-                                          </p:stCondLst>
-                                        </p:cTn>
-                                        <p:tgtEl>
-                                          <p:spTgt spid="3">
-                                            <p:txEl>
-                                              <p:pRg st="0" end="0"/>
-                                            </p:txEl>
-                                          </p:spTgt>
-                                        </p:tgtEl>
-                                        <p:attrNameLst>
-                                          <p:attrName>style.visibility</p:attrName>
-                                        </p:attrNameLst>
-                                      </p:cBhvr>
-                                      <p:to>
-                                        <p:strVal val="visible"/>
-                                      </p:to>
-                                    </p:set>
-                                    <p:animEffect transition="in" filter="fade">
-                                      <p:cBhvr>
-                                        <p:cTn id="7" dur="500"/>
-                                        <p:tgtEl>
-                                          <p:spTgt spid="3">
-                                            <p:txEl>
-                                              <p:pRg st="0" end="0"/>
                                             </p:txEl>
                                           </p:spTgt>
                                         </p:tgtEl>
@@ -9201,6 +8911,794 @@
           <a:p>
             <a:r>
               <a:rPr lang="en-US" dirty="0" smtClean="0"/>
+              <a:t>Calculation</a:t>
+            </a:r>
+            <a:endParaRPr lang="en-US" dirty="0"/>
+          </a:p>
+        </p:txBody>
+      </p:sp>
+      <p:sp>
+        <p:nvSpPr>
+          <p:cNvPr id="3" name="Content Placeholder 2"/>
+          <p:cNvSpPr>
+            <a:spLocks noGrp="1"/>
+          </p:cNvSpPr>
+          <p:nvPr>
+            <p:ph idx="1"/>
+          </p:nvPr>
+        </p:nvSpPr>
+        <p:spPr/>
+        <p:txBody>
+          <a:bodyPr>
+            <a:normAutofit/>
+          </a:bodyPr>
+          <a:lstStyle/>
+          <a:p>
+            <a:r>
+              <a:rPr lang="en-US" sz="2400" dirty="0"/>
+              <a:t>The calculation operations are pretty straightforward: +, -, * and </a:t>
+            </a:r>
+            <a:r>
+              <a:rPr lang="en-US" sz="2400" dirty="0" smtClean="0"/>
+              <a:t>/.</a:t>
+            </a:r>
+          </a:p>
+          <a:p>
+            <a:r>
+              <a:rPr lang="en-US" sz="2400" dirty="0"/>
+              <a:t>A more peculiar operation is the modulo operation %, which calculates the remainder of a division</a:t>
+            </a:r>
+            <a:r>
+              <a:rPr lang="en-US" sz="2400" dirty="0" smtClean="0"/>
+              <a:t>.</a:t>
+            </a:r>
+          </a:p>
+          <a:p>
+            <a:r>
+              <a:rPr lang="en-US" sz="2400" dirty="0"/>
+              <a:t>The order of operations is also pretty straightforward: the operations are calculated from left to right taking the parentheses into account.</a:t>
+            </a:r>
+          </a:p>
+        </p:txBody>
+      </p:sp>
+    </p:spTree>
+    <p:extLst>
+      <p:ext uri="{BB962C8B-B14F-4D97-AF65-F5344CB8AC3E}">
+        <p14:creationId xmlns:p14="http://schemas.microsoft.com/office/powerpoint/2010/main" val="2511286958"/>
+      </p:ext>
+    </p:extLst>
+  </p:cSld>
+  <p:clrMapOvr>
+    <a:masterClrMapping/>
+  </p:clrMapOvr>
+  <p:timing>
+    <p:tnLst>
+      <p:par>
+        <p:cTn id="1" dur="indefinite" restart="never" nodeType="tmRoot">
+          <p:childTnLst>
+            <p:seq concurrent="1" nextAc="seek">
+              <p:cTn id="2" dur="indefinite" nodeType="mainSeq">
+                <p:childTnLst>
+                  <p:par>
+                    <p:cTn id="3" fill="hold">
+                      <p:stCondLst>
+                        <p:cond delay="indefinite"/>
+                      </p:stCondLst>
+                      <p:childTnLst>
+                        <p:par>
+                          <p:cTn id="4" fill="hold">
+                            <p:stCondLst>
+                              <p:cond delay="0"/>
+                            </p:stCondLst>
+                            <p:childTnLst>
+                              <p:par>
+                                <p:cTn id="5" presetID="10" presetClass="entr" presetSubtype="0" fill="hold" nodeType="clickEffect">
+                                  <p:stCondLst>
+                                    <p:cond delay="0"/>
+                                  </p:stCondLst>
+                                  <p:childTnLst>
+                                    <p:set>
+                                      <p:cBhvr>
+                                        <p:cTn id="6" dur="1" fill="hold">
+                                          <p:stCondLst>
+                                            <p:cond delay="0"/>
+                                          </p:stCondLst>
+                                        </p:cTn>
+                                        <p:tgtEl>
+                                          <p:spTgt spid="3">
+                                            <p:txEl>
+                                              <p:pRg st="0" end="0"/>
+                                            </p:txEl>
+                                          </p:spTgt>
+                                        </p:tgtEl>
+                                        <p:attrNameLst>
+                                          <p:attrName>style.visibility</p:attrName>
+                                        </p:attrNameLst>
+                                      </p:cBhvr>
+                                      <p:to>
+                                        <p:strVal val="visible"/>
+                                      </p:to>
+                                    </p:set>
+                                    <p:animEffect transition="in" filter="fade">
+                                      <p:cBhvr>
+                                        <p:cTn id="7" dur="500"/>
+                                        <p:tgtEl>
+                                          <p:spTgt spid="3">
+                                            <p:txEl>
+                                              <p:pRg st="0" end="0"/>
+                                            </p:txEl>
+                                          </p:spTgt>
+                                        </p:tgtEl>
+                                      </p:cBhvr>
+                                    </p:animEffect>
+                                  </p:childTnLst>
+                                </p:cTn>
+                              </p:par>
+                            </p:childTnLst>
+                          </p:cTn>
+                        </p:par>
+                      </p:childTnLst>
+                    </p:cTn>
+                  </p:par>
+                  <p:par>
+                    <p:cTn id="8" fill="hold">
+                      <p:stCondLst>
+                        <p:cond delay="indefinite"/>
+                      </p:stCondLst>
+                      <p:childTnLst>
+                        <p:par>
+                          <p:cTn id="9" fill="hold">
+                            <p:stCondLst>
+                              <p:cond delay="0"/>
+                            </p:stCondLst>
+                            <p:childTnLst>
+                              <p:par>
+                                <p:cTn id="10" presetID="10" presetClass="entr" presetSubtype="0" fill="hold" nodeType="clickEffect">
+                                  <p:stCondLst>
+                                    <p:cond delay="0"/>
+                                  </p:stCondLst>
+                                  <p:childTnLst>
+                                    <p:set>
+                                      <p:cBhvr>
+                                        <p:cTn id="11" dur="1" fill="hold">
+                                          <p:stCondLst>
+                                            <p:cond delay="0"/>
+                                          </p:stCondLst>
+                                        </p:cTn>
+                                        <p:tgtEl>
+                                          <p:spTgt spid="3">
+                                            <p:txEl>
+                                              <p:pRg st="1" end="1"/>
+                                            </p:txEl>
+                                          </p:spTgt>
+                                        </p:tgtEl>
+                                        <p:attrNameLst>
+                                          <p:attrName>style.visibility</p:attrName>
+                                        </p:attrNameLst>
+                                      </p:cBhvr>
+                                      <p:to>
+                                        <p:strVal val="visible"/>
+                                      </p:to>
+                                    </p:set>
+                                    <p:animEffect transition="in" filter="fade">
+                                      <p:cBhvr>
+                                        <p:cTn id="12" dur="500"/>
+                                        <p:tgtEl>
+                                          <p:spTgt spid="3">
+                                            <p:txEl>
+                                              <p:pRg st="1" end="1"/>
+                                            </p:txEl>
+                                          </p:spTgt>
+                                        </p:tgtEl>
+                                      </p:cBhvr>
+                                    </p:animEffect>
+                                  </p:childTnLst>
+                                </p:cTn>
+                              </p:par>
+                            </p:childTnLst>
+                          </p:cTn>
+                        </p:par>
+                      </p:childTnLst>
+                    </p:cTn>
+                  </p:par>
+                  <p:par>
+                    <p:cTn id="13" fill="hold">
+                      <p:stCondLst>
+                        <p:cond delay="indefinite"/>
+                      </p:stCondLst>
+                      <p:childTnLst>
+                        <p:par>
+                          <p:cTn id="14" fill="hold">
+                            <p:stCondLst>
+                              <p:cond delay="0"/>
+                            </p:stCondLst>
+                            <p:childTnLst>
+                              <p:par>
+                                <p:cTn id="15" presetID="10" presetClass="entr" presetSubtype="0" fill="hold" nodeType="clickEffect">
+                                  <p:stCondLst>
+                                    <p:cond delay="0"/>
+                                  </p:stCondLst>
+                                  <p:childTnLst>
+                                    <p:set>
+                                      <p:cBhvr>
+                                        <p:cTn id="16" dur="1" fill="hold">
+                                          <p:stCondLst>
+                                            <p:cond delay="0"/>
+                                          </p:stCondLst>
+                                        </p:cTn>
+                                        <p:tgtEl>
+                                          <p:spTgt spid="3">
+                                            <p:txEl>
+                                              <p:pRg st="2" end="2"/>
+                                            </p:txEl>
+                                          </p:spTgt>
+                                        </p:tgtEl>
+                                        <p:attrNameLst>
+                                          <p:attrName>style.visibility</p:attrName>
+                                        </p:attrNameLst>
+                                      </p:cBhvr>
+                                      <p:to>
+                                        <p:strVal val="visible"/>
+                                      </p:to>
+                                    </p:set>
+                                    <p:animEffect transition="in" filter="fade">
+                                      <p:cBhvr>
+                                        <p:cTn id="17" dur="500"/>
+                                        <p:tgtEl>
+                                          <p:spTgt spid="3">
+                                            <p:txEl>
+                                              <p:pRg st="2" end="2"/>
+                                            </p:txEl>
+                                          </p:spTgt>
+                                        </p:tgtEl>
+                                      </p:cBhvr>
+                                    </p:animEffect>
+                                  </p:childTnLst>
+                                </p:cTn>
+                              </p:par>
+                            </p:childTnLst>
+                          </p:cTn>
+                        </p:par>
+                      </p:childTnLst>
+                    </p:cTn>
+                  </p:par>
+                </p:childTnLst>
+              </p:cTn>
+              <p:prevCondLst>
+                <p:cond evt="onPrev" delay="0">
+                  <p:tgtEl>
+                    <p:sldTgt/>
+                  </p:tgtEl>
+                </p:cond>
+              </p:prevCondLst>
+              <p:nextCondLst>
+                <p:cond evt="onNext" delay="0">
+                  <p:tgtEl>
+                    <p:sldTgt/>
+                  </p:tgtEl>
+                </p:cond>
+              </p:nextCondLst>
+            </p:seq>
+          </p:childTnLst>
+        </p:cTn>
+      </p:par>
+    </p:tnLst>
+  </p:timing>
+</p:sld>
+</file>
+
+<file path=ppt/slides/slide21.xml><?xml version="1.0" encoding="utf-8"?>
+<p:sld xmlns:a="http://schemas.openxmlformats.org/drawingml/2006/main" xmlns:r="http://schemas.openxmlformats.org/officeDocument/2006/relationships" xmlns:p="http://schemas.openxmlformats.org/presentationml/2006/main">
+  <p:cSld>
+    <p:spTree>
+      <p:nvGrpSpPr>
+        <p:cNvPr id="1" name=""/>
+        <p:cNvGrpSpPr/>
+        <p:nvPr/>
+      </p:nvGrpSpPr>
+      <p:grpSpPr>
+        <a:xfrm>
+          <a:off x="0" y="0"/>
+          <a:ext cx="0" cy="0"/>
+          <a:chOff x="0" y="0"/>
+          <a:chExt cx="0" cy="0"/>
+        </a:xfrm>
+      </p:grpSpPr>
+      <p:sp>
+        <p:nvSpPr>
+          <p:cNvPr id="2" name="Title 1"/>
+          <p:cNvSpPr>
+            <a:spLocks noGrp="1"/>
+          </p:cNvSpPr>
+          <p:nvPr>
+            <p:ph type="title"/>
+          </p:nvPr>
+        </p:nvSpPr>
+        <p:spPr/>
+        <p:txBody>
+          <a:bodyPr/>
+          <a:lstStyle/>
+          <a:p>
+            <a:r>
+              <a:rPr lang="en-US" dirty="0" smtClean="0"/>
+              <a:t>Floating point numbers</a:t>
+            </a:r>
+            <a:endParaRPr lang="en-US" dirty="0"/>
+          </a:p>
+        </p:txBody>
+      </p:sp>
+      <p:sp>
+        <p:nvSpPr>
+          <p:cNvPr id="3" name="Content Placeholder 2"/>
+          <p:cNvSpPr>
+            <a:spLocks noGrp="1"/>
+          </p:cNvSpPr>
+          <p:nvPr>
+            <p:ph idx="1"/>
+          </p:nvPr>
+        </p:nvSpPr>
+        <p:spPr/>
+        <p:txBody>
+          <a:bodyPr>
+            <a:normAutofit/>
+          </a:bodyPr>
+          <a:lstStyle/>
+          <a:p>
+            <a:r>
+              <a:rPr lang="en-US" sz="2800" dirty="0"/>
+              <a:t>Calculating the division and remainder of whole numbers is a little trickier</a:t>
+            </a:r>
+            <a:r>
+              <a:rPr lang="en-US" sz="2800" dirty="0" smtClean="0"/>
+              <a:t>.</a:t>
+            </a:r>
+          </a:p>
+          <a:p>
+            <a:r>
+              <a:rPr lang="en-US" sz="2800" dirty="0"/>
+              <a:t>A floating point number (decimal number) and integer (whole number) often get mixed up</a:t>
+            </a:r>
+            <a:r>
+              <a:rPr lang="en-US" sz="2800" dirty="0" smtClean="0"/>
+              <a:t>.</a:t>
+            </a:r>
+          </a:p>
+          <a:p>
+            <a:r>
+              <a:rPr lang="en-US" sz="2800" dirty="0"/>
+              <a:t>If all the variables in a calculation operation are integers, the end result will also be an integer.</a:t>
+            </a:r>
+          </a:p>
+        </p:txBody>
+      </p:sp>
+    </p:spTree>
+    <p:extLst>
+      <p:ext uri="{BB962C8B-B14F-4D97-AF65-F5344CB8AC3E}">
+        <p14:creationId xmlns:p14="http://schemas.microsoft.com/office/powerpoint/2010/main" val="1719028210"/>
+      </p:ext>
+    </p:extLst>
+  </p:cSld>
+  <p:clrMapOvr>
+    <a:masterClrMapping/>
+  </p:clrMapOvr>
+  <p:timing>
+    <p:tnLst>
+      <p:par>
+        <p:cTn id="1" dur="indefinite" restart="never" nodeType="tmRoot">
+          <p:childTnLst>
+            <p:seq concurrent="1" nextAc="seek">
+              <p:cTn id="2" dur="indefinite" nodeType="mainSeq">
+                <p:childTnLst>
+                  <p:par>
+                    <p:cTn id="3" fill="hold">
+                      <p:stCondLst>
+                        <p:cond delay="indefinite"/>
+                      </p:stCondLst>
+                      <p:childTnLst>
+                        <p:par>
+                          <p:cTn id="4" fill="hold">
+                            <p:stCondLst>
+                              <p:cond delay="0"/>
+                            </p:stCondLst>
+                            <p:childTnLst>
+                              <p:par>
+                                <p:cTn id="5" presetID="10" presetClass="entr" presetSubtype="0" fill="hold" nodeType="clickEffect">
+                                  <p:stCondLst>
+                                    <p:cond delay="0"/>
+                                  </p:stCondLst>
+                                  <p:childTnLst>
+                                    <p:set>
+                                      <p:cBhvr>
+                                        <p:cTn id="6" dur="1" fill="hold">
+                                          <p:stCondLst>
+                                            <p:cond delay="0"/>
+                                          </p:stCondLst>
+                                        </p:cTn>
+                                        <p:tgtEl>
+                                          <p:spTgt spid="3">
+                                            <p:txEl>
+                                              <p:pRg st="0" end="0"/>
+                                            </p:txEl>
+                                          </p:spTgt>
+                                        </p:tgtEl>
+                                        <p:attrNameLst>
+                                          <p:attrName>style.visibility</p:attrName>
+                                        </p:attrNameLst>
+                                      </p:cBhvr>
+                                      <p:to>
+                                        <p:strVal val="visible"/>
+                                      </p:to>
+                                    </p:set>
+                                    <p:animEffect transition="in" filter="fade">
+                                      <p:cBhvr>
+                                        <p:cTn id="7" dur="500"/>
+                                        <p:tgtEl>
+                                          <p:spTgt spid="3">
+                                            <p:txEl>
+                                              <p:pRg st="0" end="0"/>
+                                            </p:txEl>
+                                          </p:spTgt>
+                                        </p:tgtEl>
+                                      </p:cBhvr>
+                                    </p:animEffect>
+                                  </p:childTnLst>
+                                </p:cTn>
+                              </p:par>
+                            </p:childTnLst>
+                          </p:cTn>
+                        </p:par>
+                      </p:childTnLst>
+                    </p:cTn>
+                  </p:par>
+                  <p:par>
+                    <p:cTn id="8" fill="hold">
+                      <p:stCondLst>
+                        <p:cond delay="indefinite"/>
+                      </p:stCondLst>
+                      <p:childTnLst>
+                        <p:par>
+                          <p:cTn id="9" fill="hold">
+                            <p:stCondLst>
+                              <p:cond delay="0"/>
+                            </p:stCondLst>
+                            <p:childTnLst>
+                              <p:par>
+                                <p:cTn id="10" presetID="10" presetClass="entr" presetSubtype="0" fill="hold" nodeType="clickEffect">
+                                  <p:stCondLst>
+                                    <p:cond delay="0"/>
+                                  </p:stCondLst>
+                                  <p:childTnLst>
+                                    <p:set>
+                                      <p:cBhvr>
+                                        <p:cTn id="11" dur="1" fill="hold">
+                                          <p:stCondLst>
+                                            <p:cond delay="0"/>
+                                          </p:stCondLst>
+                                        </p:cTn>
+                                        <p:tgtEl>
+                                          <p:spTgt spid="3">
+                                            <p:txEl>
+                                              <p:pRg st="1" end="1"/>
+                                            </p:txEl>
+                                          </p:spTgt>
+                                        </p:tgtEl>
+                                        <p:attrNameLst>
+                                          <p:attrName>style.visibility</p:attrName>
+                                        </p:attrNameLst>
+                                      </p:cBhvr>
+                                      <p:to>
+                                        <p:strVal val="visible"/>
+                                      </p:to>
+                                    </p:set>
+                                    <p:animEffect transition="in" filter="fade">
+                                      <p:cBhvr>
+                                        <p:cTn id="12" dur="500"/>
+                                        <p:tgtEl>
+                                          <p:spTgt spid="3">
+                                            <p:txEl>
+                                              <p:pRg st="1" end="1"/>
+                                            </p:txEl>
+                                          </p:spTgt>
+                                        </p:tgtEl>
+                                      </p:cBhvr>
+                                    </p:animEffect>
+                                  </p:childTnLst>
+                                </p:cTn>
+                              </p:par>
+                            </p:childTnLst>
+                          </p:cTn>
+                        </p:par>
+                      </p:childTnLst>
+                    </p:cTn>
+                  </p:par>
+                  <p:par>
+                    <p:cTn id="13" fill="hold">
+                      <p:stCondLst>
+                        <p:cond delay="indefinite"/>
+                      </p:stCondLst>
+                      <p:childTnLst>
+                        <p:par>
+                          <p:cTn id="14" fill="hold">
+                            <p:stCondLst>
+                              <p:cond delay="0"/>
+                            </p:stCondLst>
+                            <p:childTnLst>
+                              <p:par>
+                                <p:cTn id="15" presetID="10" presetClass="entr" presetSubtype="0" fill="hold" nodeType="clickEffect">
+                                  <p:stCondLst>
+                                    <p:cond delay="0"/>
+                                  </p:stCondLst>
+                                  <p:childTnLst>
+                                    <p:set>
+                                      <p:cBhvr>
+                                        <p:cTn id="16" dur="1" fill="hold">
+                                          <p:stCondLst>
+                                            <p:cond delay="0"/>
+                                          </p:stCondLst>
+                                        </p:cTn>
+                                        <p:tgtEl>
+                                          <p:spTgt spid="3">
+                                            <p:txEl>
+                                              <p:pRg st="2" end="2"/>
+                                            </p:txEl>
+                                          </p:spTgt>
+                                        </p:tgtEl>
+                                        <p:attrNameLst>
+                                          <p:attrName>style.visibility</p:attrName>
+                                        </p:attrNameLst>
+                                      </p:cBhvr>
+                                      <p:to>
+                                        <p:strVal val="visible"/>
+                                      </p:to>
+                                    </p:set>
+                                    <p:animEffect transition="in" filter="fade">
+                                      <p:cBhvr>
+                                        <p:cTn id="17" dur="500"/>
+                                        <p:tgtEl>
+                                          <p:spTgt spid="3">
+                                            <p:txEl>
+                                              <p:pRg st="2" end="2"/>
+                                            </p:txEl>
+                                          </p:spTgt>
+                                        </p:tgtEl>
+                                      </p:cBhvr>
+                                    </p:animEffect>
+                                  </p:childTnLst>
+                                </p:cTn>
+                              </p:par>
+                            </p:childTnLst>
+                          </p:cTn>
+                        </p:par>
+                      </p:childTnLst>
+                    </p:cTn>
+                  </p:par>
+                </p:childTnLst>
+              </p:cTn>
+              <p:prevCondLst>
+                <p:cond evt="onPrev" delay="0">
+                  <p:tgtEl>
+                    <p:sldTgt/>
+                  </p:tgtEl>
+                </p:cond>
+              </p:prevCondLst>
+              <p:nextCondLst>
+                <p:cond evt="onNext" delay="0">
+                  <p:tgtEl>
+                    <p:sldTgt/>
+                  </p:tgtEl>
+                </p:cond>
+              </p:nextCondLst>
+            </p:seq>
+          </p:childTnLst>
+        </p:cTn>
+      </p:par>
+    </p:tnLst>
+  </p:timing>
+</p:sld>
+</file>
+
+<file path=ppt/slides/slide22.xml><?xml version="1.0" encoding="utf-8"?>
+<p:sld xmlns:a="http://schemas.openxmlformats.org/drawingml/2006/main" xmlns:r="http://schemas.openxmlformats.org/officeDocument/2006/relationships" xmlns:p="http://schemas.openxmlformats.org/presentationml/2006/main">
+  <p:cSld>
+    <p:spTree>
+      <p:nvGrpSpPr>
+        <p:cNvPr id="1" name=""/>
+        <p:cNvGrpSpPr/>
+        <p:nvPr/>
+      </p:nvGrpSpPr>
+      <p:grpSpPr>
+        <a:xfrm>
+          <a:off x="0" y="0"/>
+          <a:ext cx="0" cy="0"/>
+          <a:chOff x="0" y="0"/>
+          <a:chExt cx="0" cy="0"/>
+        </a:xfrm>
+      </p:grpSpPr>
+      <p:sp>
+        <p:nvSpPr>
+          <p:cNvPr id="2" name="Title 1"/>
+          <p:cNvSpPr>
+            <a:spLocks noGrp="1"/>
+          </p:cNvSpPr>
+          <p:nvPr>
+            <p:ph type="title"/>
+          </p:nvPr>
+        </p:nvSpPr>
+        <p:spPr/>
+        <p:txBody>
+          <a:bodyPr/>
+          <a:lstStyle/>
+          <a:p>
+            <a:r>
+              <a:rPr lang="en-US" dirty="0" smtClean="0"/>
+              <a:t>Concatenation</a:t>
+            </a:r>
+            <a:endParaRPr lang="en-US" dirty="0"/>
+          </a:p>
+        </p:txBody>
+      </p:sp>
+      <p:sp>
+        <p:nvSpPr>
+          <p:cNvPr id="3" name="Content Placeholder 2"/>
+          <p:cNvSpPr>
+            <a:spLocks noGrp="1"/>
+          </p:cNvSpPr>
+          <p:nvPr>
+            <p:ph idx="1"/>
+          </p:nvPr>
+        </p:nvSpPr>
+        <p:spPr/>
+        <p:txBody>
+          <a:bodyPr>
+            <a:normAutofit/>
+          </a:bodyPr>
+          <a:lstStyle/>
+          <a:p>
+            <a:r>
+              <a:rPr lang="en-US" sz="2800" dirty="0"/>
+              <a:t>If the + operator is used between two strings, a new string is created with the two strings combined.</a:t>
+            </a:r>
+          </a:p>
+        </p:txBody>
+      </p:sp>
+    </p:spTree>
+    <p:extLst>
+      <p:ext uri="{BB962C8B-B14F-4D97-AF65-F5344CB8AC3E}">
+        <p14:creationId xmlns:p14="http://schemas.microsoft.com/office/powerpoint/2010/main" val="3269883544"/>
+      </p:ext>
+    </p:extLst>
+  </p:cSld>
+  <p:clrMapOvr>
+    <a:masterClrMapping/>
+  </p:clrMapOvr>
+  <p:timing>
+    <p:tnLst>
+      <p:par>
+        <p:cTn id="1" dur="indefinite" restart="never" nodeType="tmRoot">
+          <p:childTnLst>
+            <p:seq concurrent="1" nextAc="seek">
+              <p:cTn id="2" dur="indefinite" nodeType="mainSeq">
+                <p:childTnLst>
+                  <p:par>
+                    <p:cTn id="3" fill="hold">
+                      <p:stCondLst>
+                        <p:cond delay="indefinite"/>
+                      </p:stCondLst>
+                      <p:childTnLst>
+                        <p:par>
+                          <p:cTn id="4" fill="hold">
+                            <p:stCondLst>
+                              <p:cond delay="0"/>
+                            </p:stCondLst>
+                            <p:childTnLst>
+                              <p:par>
+                                <p:cTn id="5" presetID="10" presetClass="entr" presetSubtype="0" fill="hold" nodeType="clickEffect">
+                                  <p:stCondLst>
+                                    <p:cond delay="0"/>
+                                  </p:stCondLst>
+                                  <p:childTnLst>
+                                    <p:set>
+                                      <p:cBhvr>
+                                        <p:cTn id="6" dur="1" fill="hold">
+                                          <p:stCondLst>
+                                            <p:cond delay="0"/>
+                                          </p:stCondLst>
+                                        </p:cTn>
+                                        <p:tgtEl>
+                                          <p:spTgt spid="3">
+                                            <p:txEl>
+                                              <p:pRg st="0" end="0"/>
+                                            </p:txEl>
+                                          </p:spTgt>
+                                        </p:tgtEl>
+                                        <p:attrNameLst>
+                                          <p:attrName>style.visibility</p:attrName>
+                                        </p:attrNameLst>
+                                      </p:cBhvr>
+                                      <p:to>
+                                        <p:strVal val="visible"/>
+                                      </p:to>
+                                    </p:set>
+                                    <p:animEffect transition="in" filter="fade">
+                                      <p:cBhvr>
+                                        <p:cTn id="7" dur="500"/>
+                                        <p:tgtEl>
+                                          <p:spTgt spid="3">
+                                            <p:txEl>
+                                              <p:pRg st="0" end="0"/>
+                                            </p:txEl>
+                                          </p:spTgt>
+                                        </p:tgtEl>
+                                      </p:cBhvr>
+                                    </p:animEffect>
+                                  </p:childTnLst>
+                                </p:cTn>
+                              </p:par>
+                            </p:childTnLst>
+                          </p:cTn>
+                        </p:par>
+                      </p:childTnLst>
+                    </p:cTn>
+                  </p:par>
+                </p:childTnLst>
+              </p:cTn>
+              <p:prevCondLst>
+                <p:cond evt="onPrev" delay="0">
+                  <p:tgtEl>
+                    <p:sldTgt/>
+                  </p:tgtEl>
+                </p:cond>
+              </p:prevCondLst>
+              <p:nextCondLst>
+                <p:cond evt="onNext" delay="0">
+                  <p:tgtEl>
+                    <p:sldTgt/>
+                  </p:tgtEl>
+                </p:cond>
+              </p:nextCondLst>
+            </p:seq>
+          </p:childTnLst>
+        </p:cTn>
+      </p:par>
+    </p:tnLst>
+  </p:timing>
+</p:sld>
+</file>
+
+<file path=ppt/slides/slide23.xml><?xml version="1.0" encoding="utf-8"?>
+<p:sld xmlns:a="http://schemas.openxmlformats.org/drawingml/2006/main" xmlns:r="http://schemas.openxmlformats.org/officeDocument/2006/relationships" xmlns:p="http://schemas.openxmlformats.org/presentationml/2006/main">
+  <p:cSld>
+    <p:spTree>
+      <p:nvGrpSpPr>
+        <p:cNvPr id="1" name=""/>
+        <p:cNvGrpSpPr/>
+        <p:nvPr/>
+      </p:nvGrpSpPr>
+      <p:grpSpPr>
+        <a:xfrm>
+          <a:off x="0" y="0"/>
+          <a:ext cx="0" cy="0"/>
+          <a:chOff x="0" y="0"/>
+          <a:chExt cx="0" cy="0"/>
+        </a:xfrm>
+      </p:grpSpPr>
+      <p:sp>
+        <p:nvSpPr>
+          <p:cNvPr id="2" name="Title 1"/>
+          <p:cNvSpPr>
+            <a:spLocks noGrp="1"/>
+          </p:cNvSpPr>
+          <p:nvPr>
+            <p:ph type="title"/>
+          </p:nvPr>
+        </p:nvSpPr>
+        <p:spPr/>
+        <p:txBody>
+          <a:bodyPr/>
+          <a:lstStyle/>
+          <a:p>
+            <a:r>
+              <a:rPr lang="en-US" dirty="0" smtClean="0"/>
               <a:t>Reading User Input</a:t>
             </a:r>
             <a:endParaRPr lang="en-US" dirty="0"/>
@@ -9411,7 +9909,7 @@
 </p:sld>
 </file>
 
-<file path=ppt/slides/slide21.xml><?xml version="1.0" encoding="utf-8"?>
+<file path=ppt/slides/slide24.xml><?xml version="1.0" encoding="utf-8"?>
 <p:sld xmlns:a="http://schemas.openxmlformats.org/drawingml/2006/main" xmlns:r="http://schemas.openxmlformats.org/officeDocument/2006/relationships" xmlns:p="http://schemas.openxmlformats.org/presentationml/2006/main">
   <p:cSld>
     <p:spTree>
@@ -9809,7 +10307,7 @@
 </p:sld>
 </file>
 
-<file path=ppt/slides/slide22.xml><?xml version="1.0" encoding="utf-8"?>
+<file path=ppt/slides/slide25.xml><?xml version="1.0" encoding="utf-8"?>
 <p:sld xmlns:a="http://schemas.openxmlformats.org/drawingml/2006/main" xmlns:r="http://schemas.openxmlformats.org/officeDocument/2006/relationships" xmlns:p="http://schemas.openxmlformats.org/presentationml/2006/main">
   <p:cSld>
     <p:spTree>
@@ -10255,7 +10753,7 @@
 </p:sld>
 </file>
 
-<file path=ppt/slides/slide23.xml><?xml version="1.0" encoding="utf-8"?>
+<file path=ppt/slides/slide26.xml><?xml version="1.0" encoding="utf-8"?>
 <p:sld xmlns:a="http://schemas.openxmlformats.org/drawingml/2006/main" xmlns:r="http://schemas.openxmlformats.org/officeDocument/2006/relationships" xmlns:p="http://schemas.openxmlformats.org/presentationml/2006/main">
   <p:cSld>
     <p:spTree>
@@ -10495,6 +10993,833 @@
             </p:seq>
           </p:childTnLst>
         </p:cTn>
+      </p:par>
+    </p:tnLst>
+  </p:timing>
+</p:sld>
+</file>
+
+<file path=ppt/slides/slide27.xml><?xml version="1.0" encoding="utf-8"?>
+<p:sld xmlns:a="http://schemas.openxmlformats.org/drawingml/2006/main" xmlns:r="http://schemas.openxmlformats.org/officeDocument/2006/relationships" xmlns:p="http://schemas.openxmlformats.org/presentationml/2006/main">
+  <p:cSld>
+    <p:spTree>
+      <p:nvGrpSpPr>
+        <p:cNvPr id="1" name=""/>
+        <p:cNvGrpSpPr/>
+        <p:nvPr/>
+      </p:nvGrpSpPr>
+      <p:grpSpPr>
+        <a:xfrm>
+          <a:off x="0" y="0"/>
+          <a:ext cx="0" cy="0"/>
+          <a:chOff x="0" y="0"/>
+          <a:chExt cx="0" cy="0"/>
+        </a:xfrm>
+      </p:grpSpPr>
+      <p:sp>
+        <p:nvSpPr>
+          <p:cNvPr id="2" name="Title 1"/>
+          <p:cNvSpPr>
+            <a:spLocks noGrp="1"/>
+          </p:cNvSpPr>
+          <p:nvPr>
+            <p:ph type="title"/>
+          </p:nvPr>
+        </p:nvSpPr>
+        <p:spPr/>
+        <p:txBody>
+          <a:bodyPr/>
+          <a:lstStyle/>
+          <a:p>
+            <a:r>
+              <a:rPr lang="en-US" dirty="0" smtClean="0"/>
+              <a:t>Exercise 4</a:t>
+            </a:r>
+            <a:endParaRPr lang="en-US" dirty="0"/>
+          </a:p>
+        </p:txBody>
+      </p:sp>
+      <p:sp>
+        <p:nvSpPr>
+          <p:cNvPr id="3" name="Content Placeholder 2"/>
+          <p:cNvSpPr>
+            <a:spLocks noGrp="1"/>
+          </p:cNvSpPr>
+          <p:nvPr>
+            <p:ph idx="1"/>
+          </p:nvPr>
+        </p:nvSpPr>
+        <p:spPr/>
+        <p:txBody>
+          <a:bodyPr>
+            <a:normAutofit fontScale="25000" lnSpcReduction="20000"/>
+          </a:bodyPr>
+          <a:lstStyle/>
+          <a:p>
+            <a:r>
+              <a:rPr lang="en-US" sz="7200" dirty="0"/>
+              <a:t>Varying variables</a:t>
+            </a:r>
+            <a:endParaRPr lang="en-US" sz="7200" dirty="0" smtClean="0"/>
+          </a:p>
+          <a:p>
+            <a:pPr lvl="1"/>
+            <a:r>
+              <a:rPr lang="en-US" sz="6400" dirty="0"/>
+              <a:t>The exercise file </a:t>
+            </a:r>
+            <a:r>
+              <a:rPr lang="en-US" sz="6400" dirty="0" smtClean="0"/>
+              <a:t>initially </a:t>
+            </a:r>
+          </a:p>
+          <a:p>
+            <a:pPr marL="457200" lvl="1" indent="0">
+              <a:buNone/>
+            </a:pPr>
+            <a:r>
+              <a:rPr lang="en-US" sz="6400" dirty="0" smtClean="0"/>
+              <a:t>contains </a:t>
+            </a:r>
+            <a:r>
+              <a:rPr lang="en-US" sz="6400" dirty="0"/>
+              <a:t>a program which prints</a:t>
+            </a:r>
+            <a:r>
+              <a:rPr lang="en-US" sz="6400" dirty="0" smtClean="0"/>
+              <a:t>:</a:t>
+            </a:r>
+          </a:p>
+          <a:p>
+            <a:pPr marL="457200" lvl="1" indent="0">
+              <a:buNone/>
+            </a:pPr>
+            <a:endParaRPr lang="en-US" sz="6400" dirty="0"/>
+          </a:p>
+          <a:p>
+            <a:pPr marL="457200" lvl="1" indent="0">
+              <a:buNone/>
+            </a:pPr>
+            <a:endParaRPr lang="en-US" sz="6400" dirty="0" smtClean="0"/>
+          </a:p>
+          <a:p>
+            <a:pPr marL="457200" lvl="1" indent="0">
+              <a:buNone/>
+            </a:pPr>
+            <a:endParaRPr lang="en-US" sz="6400" dirty="0" smtClean="0"/>
+          </a:p>
+          <a:p>
+            <a:pPr lvl="1"/>
+            <a:r>
+              <a:rPr lang="en-US" sz="6400" dirty="0"/>
+              <a:t>Change the program in </a:t>
+            </a:r>
+            <a:endParaRPr lang="en-US" sz="6400" dirty="0" smtClean="0"/>
+          </a:p>
+          <a:p>
+            <a:pPr marL="457200" lvl="1" indent="0">
+              <a:buNone/>
+            </a:pPr>
+            <a:r>
+              <a:rPr lang="en-US" sz="6400" dirty="0" smtClean="0"/>
+              <a:t>the </a:t>
+            </a:r>
+            <a:r>
+              <a:rPr lang="en-US" sz="6400" dirty="0"/>
+              <a:t>specified places so that </a:t>
+            </a:r>
+            <a:r>
+              <a:rPr lang="en-US" sz="6400" dirty="0" smtClean="0"/>
+              <a:t>it</a:t>
+            </a:r>
+          </a:p>
+          <a:p>
+            <a:pPr marL="457200" lvl="1" indent="0">
+              <a:buNone/>
+            </a:pPr>
+            <a:r>
+              <a:rPr lang="en-US" sz="6400" dirty="0" smtClean="0"/>
+              <a:t>will </a:t>
+            </a:r>
+            <a:r>
+              <a:rPr lang="en-US" sz="6400" dirty="0"/>
+              <a:t>print:</a:t>
+            </a:r>
+          </a:p>
+          <a:p>
+            <a:pPr marL="0" indent="0">
+              <a:buNone/>
+            </a:pPr>
+            <a:r>
+              <a:rPr lang="en-US" dirty="0"/>
+              <a:t/>
+            </a:r>
+            <a:br>
+              <a:rPr lang="en-US" dirty="0"/>
+            </a:br>
+            <a:r>
+              <a:rPr lang="en-US" dirty="0"/>
+              <a:t/>
+            </a:r>
+            <a:br>
+              <a:rPr lang="en-US" dirty="0"/>
+            </a:br>
+            <a:endParaRPr lang="en-US" dirty="0"/>
+          </a:p>
+        </p:txBody>
+      </p:sp>
+      <p:sp>
+        <p:nvSpPr>
+          <p:cNvPr id="4" name="Rectangle 3"/>
+          <p:cNvSpPr/>
+          <p:nvPr/>
+        </p:nvSpPr>
+        <p:spPr>
+          <a:xfrm>
+            <a:off x="4572000" y="1123950"/>
+            <a:ext cx="3124200" cy="1371600"/>
+          </a:xfrm>
+          <a:prstGeom prst="rect">
+            <a:avLst/>
+          </a:prstGeom>
+          <a:ln w="9525"/>
+        </p:spPr>
+        <p:style>
+          <a:lnRef idx="2">
+            <a:schemeClr val="dk1"/>
+          </a:lnRef>
+          <a:fillRef idx="1">
+            <a:schemeClr val="lt1"/>
+          </a:fillRef>
+          <a:effectRef idx="0">
+            <a:schemeClr val="dk1"/>
+          </a:effectRef>
+          <a:fontRef idx="minor">
+            <a:schemeClr val="dk1"/>
+          </a:fontRef>
+        </p:style>
+        <p:txBody>
+          <a:bodyPr rtlCol="0" anchor="ctr"/>
+          <a:lstStyle/>
+          <a:p>
+            <a:r>
+              <a:rPr lang="en-US" sz="800" dirty="0"/>
+              <a:t>Chickens: </a:t>
+            </a:r>
+            <a:endParaRPr lang="en-US" sz="800" dirty="0" smtClean="0"/>
+          </a:p>
+          <a:p>
+            <a:r>
+              <a:rPr lang="en-US" sz="800" dirty="0" smtClean="0"/>
+              <a:t>3 </a:t>
+            </a:r>
+          </a:p>
+          <a:p>
+            <a:r>
+              <a:rPr lang="en-US" sz="800" dirty="0" smtClean="0"/>
+              <a:t>Bacon </a:t>
+            </a:r>
+            <a:r>
+              <a:rPr lang="en-US" sz="800" dirty="0"/>
+              <a:t>(kg</a:t>
+            </a:r>
+            <a:r>
+              <a:rPr lang="en-US" sz="800" dirty="0" smtClean="0"/>
+              <a:t>):</a:t>
+            </a:r>
+          </a:p>
+          <a:p>
+            <a:r>
+              <a:rPr lang="en-US" sz="800" dirty="0" smtClean="0"/>
+              <a:t>5.5</a:t>
+            </a:r>
+          </a:p>
+          <a:p>
+            <a:r>
+              <a:rPr lang="en-US" sz="800" dirty="0" smtClean="0"/>
+              <a:t>A tractor:</a:t>
+            </a:r>
+          </a:p>
+          <a:p>
+            <a:r>
+              <a:rPr lang="en-US" sz="800" dirty="0" smtClean="0"/>
+              <a:t>There </a:t>
+            </a:r>
+            <a:r>
+              <a:rPr lang="en-US" sz="800" dirty="0"/>
+              <a:t>is </a:t>
+            </a:r>
+            <a:r>
+              <a:rPr lang="en-US" sz="800" dirty="0" smtClean="0"/>
+              <a:t>none!</a:t>
+            </a:r>
+          </a:p>
+          <a:p>
+            <a:endParaRPr lang="en-US" sz="800" dirty="0" smtClean="0"/>
+          </a:p>
+          <a:p>
+            <a:r>
+              <a:rPr lang="en-US" sz="800" dirty="0" smtClean="0"/>
+              <a:t>In </a:t>
+            </a:r>
+            <a:r>
+              <a:rPr lang="en-US" sz="800" dirty="0"/>
+              <a:t>a nutshell: </a:t>
+            </a:r>
+            <a:endParaRPr lang="en-US" sz="800" dirty="0" smtClean="0"/>
+          </a:p>
+          <a:p>
+            <a:r>
+              <a:rPr lang="en-US" sz="800" dirty="0" smtClean="0"/>
+              <a:t>3 </a:t>
+            </a:r>
+          </a:p>
+          <a:p>
+            <a:r>
+              <a:rPr lang="en-US" sz="800" dirty="0" smtClean="0"/>
+              <a:t>5.5 </a:t>
+            </a:r>
+          </a:p>
+          <a:p>
+            <a:r>
+              <a:rPr lang="en-US" sz="800" dirty="0" smtClean="0"/>
+              <a:t>There </a:t>
+            </a:r>
+            <a:r>
+              <a:rPr lang="en-US" sz="800" dirty="0"/>
+              <a:t>is none!</a:t>
+            </a:r>
+          </a:p>
+        </p:txBody>
+      </p:sp>
+      <p:sp>
+        <p:nvSpPr>
+          <p:cNvPr id="5" name="Rectangle 4"/>
+          <p:cNvSpPr/>
+          <p:nvPr/>
+        </p:nvSpPr>
+        <p:spPr>
+          <a:xfrm>
+            <a:off x="4572000" y="2724150"/>
+            <a:ext cx="3124200" cy="1371600"/>
+          </a:xfrm>
+          <a:prstGeom prst="rect">
+            <a:avLst/>
+          </a:prstGeom>
+          <a:ln w="9525"/>
+        </p:spPr>
+        <p:style>
+          <a:lnRef idx="2">
+            <a:schemeClr val="dk1"/>
+          </a:lnRef>
+          <a:fillRef idx="1">
+            <a:schemeClr val="lt1"/>
+          </a:fillRef>
+          <a:effectRef idx="0">
+            <a:schemeClr val="dk1"/>
+          </a:effectRef>
+          <a:fontRef idx="minor">
+            <a:schemeClr val="dk1"/>
+          </a:fontRef>
+        </p:style>
+        <p:txBody>
+          <a:bodyPr rtlCol="0" anchor="ctr"/>
+          <a:lstStyle/>
+          <a:p>
+            <a:r>
+              <a:rPr lang="en-US" sz="800" dirty="0"/>
+              <a:t>Chickens: </a:t>
+            </a:r>
+          </a:p>
+          <a:p>
+            <a:r>
+              <a:rPr lang="en-US" sz="800" dirty="0" smtClean="0"/>
+              <a:t>9000</a:t>
+            </a:r>
+            <a:endParaRPr lang="en-US" sz="800" dirty="0"/>
+          </a:p>
+          <a:p>
+            <a:r>
+              <a:rPr lang="en-US" sz="800" dirty="0"/>
+              <a:t>Bacon (kg):</a:t>
+            </a:r>
+          </a:p>
+          <a:p>
+            <a:r>
+              <a:rPr lang="en-US" sz="800" dirty="0" smtClean="0"/>
+              <a:t>0.1</a:t>
+            </a:r>
+            <a:endParaRPr lang="en-US" sz="800" dirty="0"/>
+          </a:p>
+          <a:p>
+            <a:r>
+              <a:rPr lang="en-US" sz="800" dirty="0"/>
+              <a:t>A tractor:</a:t>
+            </a:r>
+          </a:p>
+          <a:p>
+            <a:r>
+              <a:rPr lang="en-US" sz="800" dirty="0" err="1" smtClean="0"/>
+              <a:t>Zetor</a:t>
+            </a:r>
+            <a:endParaRPr lang="en-US" sz="800" dirty="0" smtClean="0"/>
+          </a:p>
+          <a:p>
+            <a:endParaRPr lang="en-US" sz="800" dirty="0"/>
+          </a:p>
+          <a:p>
+            <a:r>
+              <a:rPr lang="en-US" sz="800" dirty="0"/>
+              <a:t>In a nutshell: </a:t>
+            </a:r>
+          </a:p>
+          <a:p>
+            <a:r>
+              <a:rPr lang="en-US" sz="800" dirty="0" smtClean="0"/>
+              <a:t>9000</a:t>
+            </a:r>
+            <a:endParaRPr lang="en-US" sz="800" dirty="0"/>
+          </a:p>
+          <a:p>
+            <a:r>
+              <a:rPr lang="en-US" sz="800" dirty="0" smtClean="0"/>
+              <a:t>0.1</a:t>
+            </a:r>
+            <a:endParaRPr lang="en-US" sz="800" dirty="0"/>
+          </a:p>
+          <a:p>
+            <a:r>
+              <a:rPr lang="en-US" sz="800" dirty="0" err="1" smtClean="0"/>
+              <a:t>Zetor</a:t>
+            </a:r>
+            <a:endParaRPr lang="en-US" sz="800" dirty="0"/>
+          </a:p>
+        </p:txBody>
+      </p:sp>
+    </p:spTree>
+    <p:extLst>
+      <p:ext uri="{BB962C8B-B14F-4D97-AF65-F5344CB8AC3E}">
+        <p14:creationId xmlns:p14="http://schemas.microsoft.com/office/powerpoint/2010/main" val="1869822733"/>
+      </p:ext>
+    </p:extLst>
+  </p:cSld>
+  <p:clrMapOvr>
+    <a:masterClrMapping/>
+  </p:clrMapOvr>
+  <p:timing>
+    <p:tnLst>
+      <p:par>
+        <p:cTn id="1" dur="indefinite" restart="never" nodeType="tmRoot"/>
+      </p:par>
+    </p:tnLst>
+  </p:timing>
+</p:sld>
+</file>
+
+<file path=ppt/slides/slide28.xml><?xml version="1.0" encoding="utf-8"?>
+<p:sld xmlns:a="http://schemas.openxmlformats.org/drawingml/2006/main" xmlns:r="http://schemas.openxmlformats.org/officeDocument/2006/relationships" xmlns:p="http://schemas.openxmlformats.org/presentationml/2006/main">
+  <p:cSld>
+    <p:spTree>
+      <p:nvGrpSpPr>
+        <p:cNvPr id="1" name=""/>
+        <p:cNvGrpSpPr/>
+        <p:nvPr/>
+      </p:nvGrpSpPr>
+      <p:grpSpPr>
+        <a:xfrm>
+          <a:off x="0" y="0"/>
+          <a:ext cx="0" cy="0"/>
+          <a:chOff x="0" y="0"/>
+          <a:chExt cx="0" cy="0"/>
+        </a:xfrm>
+      </p:grpSpPr>
+      <p:sp>
+        <p:nvSpPr>
+          <p:cNvPr id="2" name="Title 1"/>
+          <p:cNvSpPr>
+            <a:spLocks noGrp="1"/>
+          </p:cNvSpPr>
+          <p:nvPr>
+            <p:ph type="title"/>
+          </p:nvPr>
+        </p:nvSpPr>
+        <p:spPr/>
+        <p:txBody>
+          <a:bodyPr/>
+          <a:lstStyle/>
+          <a:p>
+            <a:r>
+              <a:rPr lang="en-US" dirty="0" smtClean="0"/>
+              <a:t>Exercise 5</a:t>
+            </a:r>
+            <a:endParaRPr lang="en-US" dirty="0"/>
+          </a:p>
+        </p:txBody>
+      </p:sp>
+      <p:sp>
+        <p:nvSpPr>
+          <p:cNvPr id="3" name="Content Placeholder 2"/>
+          <p:cNvSpPr>
+            <a:spLocks noGrp="1"/>
+          </p:cNvSpPr>
+          <p:nvPr>
+            <p:ph idx="1"/>
+          </p:nvPr>
+        </p:nvSpPr>
+        <p:spPr/>
+        <p:txBody>
+          <a:bodyPr>
+            <a:normAutofit fontScale="85000" lnSpcReduction="20000"/>
+          </a:bodyPr>
+          <a:lstStyle/>
+          <a:p>
+            <a:r>
+              <a:rPr lang="en-US" dirty="0" smtClean="0"/>
+              <a:t>Seconds in a year</a:t>
+            </a:r>
+          </a:p>
+          <a:p>
+            <a:pPr lvl="1"/>
+            <a:r>
+              <a:rPr lang="en-US" dirty="0"/>
+              <a:t>Create a program that counts how many seconds there are in a year. You can assume that a year consists of 365 days (therefore the year is not a leap year</a:t>
+            </a:r>
+            <a:r>
+              <a:rPr lang="en-US" dirty="0" smtClean="0"/>
+              <a:t>).</a:t>
+            </a:r>
+          </a:p>
+          <a:p>
+            <a:pPr lvl="1"/>
+            <a:r>
+              <a:rPr lang="en-US" dirty="0" smtClean="0"/>
+              <a:t>The </a:t>
+            </a:r>
+            <a:r>
+              <a:rPr lang="en-US" dirty="0"/>
+              <a:t>program should print the following:</a:t>
+            </a:r>
+          </a:p>
+          <a:p>
+            <a:pPr marL="0" indent="0">
+              <a:buNone/>
+            </a:pPr>
+            <a:r>
+              <a:rPr lang="en-US" dirty="0"/>
+              <a:t/>
+            </a:r>
+            <a:br>
+              <a:rPr lang="en-US" dirty="0"/>
+            </a:br>
+            <a:endParaRPr lang="en-US" dirty="0" smtClean="0"/>
+          </a:p>
+          <a:p>
+            <a:pPr marL="914400" lvl="2" indent="0">
+              <a:buNone/>
+            </a:pPr>
+            <a:r>
+              <a:rPr lang="en-US" dirty="0"/>
+              <a:t>X should be replaced with the calculation of your program.</a:t>
+            </a:r>
+          </a:p>
+          <a:p>
+            <a:pPr marL="914400" lvl="2" indent="0">
+              <a:buNone/>
+            </a:pPr>
+            <a:endParaRPr lang="en-US" dirty="0"/>
+          </a:p>
+          <a:p>
+            <a:pPr marL="914400" lvl="2" indent="0">
+              <a:buNone/>
+            </a:pPr>
+            <a:endParaRPr lang="en-US" dirty="0"/>
+          </a:p>
+        </p:txBody>
+      </p:sp>
+      <p:sp>
+        <p:nvSpPr>
+          <p:cNvPr id="4" name="Rectangle 3"/>
+          <p:cNvSpPr/>
+          <p:nvPr/>
+        </p:nvSpPr>
+        <p:spPr>
+          <a:xfrm>
+            <a:off x="1676400" y="2981325"/>
+            <a:ext cx="5334000" cy="533400"/>
+          </a:xfrm>
+          <a:prstGeom prst="rect">
+            <a:avLst/>
+          </a:prstGeom>
+          <a:ln w="9525"/>
+        </p:spPr>
+        <p:style>
+          <a:lnRef idx="2">
+            <a:schemeClr val="dk1"/>
+          </a:lnRef>
+          <a:fillRef idx="1">
+            <a:schemeClr val="lt1"/>
+          </a:fillRef>
+          <a:effectRef idx="0">
+            <a:schemeClr val="dk1"/>
+          </a:effectRef>
+          <a:fontRef idx="minor">
+            <a:schemeClr val="dk1"/>
+          </a:fontRef>
+        </p:style>
+        <p:txBody>
+          <a:bodyPr rtlCol="0" anchor="ctr"/>
+          <a:lstStyle/>
+          <a:p>
+            <a:r>
+              <a:rPr lang="en-US" dirty="0"/>
+              <a:t>There are X seconds in a year. </a:t>
+            </a:r>
+          </a:p>
+        </p:txBody>
+      </p:sp>
+    </p:spTree>
+    <p:extLst>
+      <p:ext uri="{BB962C8B-B14F-4D97-AF65-F5344CB8AC3E}">
+        <p14:creationId xmlns:p14="http://schemas.microsoft.com/office/powerpoint/2010/main" val="1869822733"/>
+      </p:ext>
+    </p:extLst>
+  </p:cSld>
+  <p:clrMapOvr>
+    <a:masterClrMapping/>
+  </p:clrMapOvr>
+  <p:timing>
+    <p:tnLst>
+      <p:par>
+        <p:cTn id="1" dur="indefinite" restart="never" nodeType="tmRoot"/>
+      </p:par>
+    </p:tnLst>
+  </p:timing>
+</p:sld>
+</file>
+
+<file path=ppt/slides/slide29.xml><?xml version="1.0" encoding="utf-8"?>
+<p:sld xmlns:a="http://schemas.openxmlformats.org/drawingml/2006/main" xmlns:r="http://schemas.openxmlformats.org/officeDocument/2006/relationships" xmlns:p="http://schemas.openxmlformats.org/presentationml/2006/main">
+  <p:cSld>
+    <p:spTree>
+      <p:nvGrpSpPr>
+        <p:cNvPr id="1" name=""/>
+        <p:cNvGrpSpPr/>
+        <p:nvPr/>
+      </p:nvGrpSpPr>
+      <p:grpSpPr>
+        <a:xfrm>
+          <a:off x="0" y="0"/>
+          <a:ext cx="0" cy="0"/>
+          <a:chOff x="0" y="0"/>
+          <a:chExt cx="0" cy="0"/>
+        </a:xfrm>
+      </p:grpSpPr>
+      <p:sp>
+        <p:nvSpPr>
+          <p:cNvPr id="2" name="Title 1"/>
+          <p:cNvSpPr>
+            <a:spLocks noGrp="1"/>
+          </p:cNvSpPr>
+          <p:nvPr>
+            <p:ph type="title"/>
+          </p:nvPr>
+        </p:nvSpPr>
+        <p:spPr/>
+        <p:txBody>
+          <a:bodyPr/>
+          <a:lstStyle/>
+          <a:p>
+            <a:r>
+              <a:rPr lang="en-US" dirty="0" smtClean="0"/>
+              <a:t>Exercise 6</a:t>
+            </a:r>
+            <a:endParaRPr lang="en-US" dirty="0"/>
+          </a:p>
+        </p:txBody>
+      </p:sp>
+      <p:sp>
+        <p:nvSpPr>
+          <p:cNvPr id="3" name="Content Placeholder 2"/>
+          <p:cNvSpPr>
+            <a:spLocks noGrp="1"/>
+          </p:cNvSpPr>
+          <p:nvPr>
+            <p:ph idx="1"/>
+          </p:nvPr>
+        </p:nvSpPr>
+        <p:spPr/>
+        <p:txBody>
+          <a:bodyPr>
+            <a:normAutofit fontScale="85000" lnSpcReduction="20000"/>
+          </a:bodyPr>
+          <a:lstStyle/>
+          <a:p>
+            <a:r>
+              <a:rPr lang="en-US" sz="1800" dirty="0" smtClean="0"/>
+              <a:t>Addition</a:t>
+            </a:r>
+          </a:p>
+          <a:p>
+            <a:pPr lvl="1"/>
+            <a:r>
+              <a:rPr lang="en-US" sz="1600" dirty="0"/>
+              <a:t>Create a program to calculate the sum of two numbers. At the beginning of the program two variables are introduced and those variables hold the numbers to be summed. Feel free to use other variables if you need </a:t>
+            </a:r>
+            <a:r>
+              <a:rPr lang="en-US" sz="1600" dirty="0" smtClean="0"/>
+              <a:t>to.</a:t>
+            </a:r>
+          </a:p>
+          <a:p>
+            <a:pPr lvl="1"/>
+            <a:r>
+              <a:rPr lang="en-US" sz="1600" dirty="0"/>
+              <a:t>For example, if the variables hold numbers 5 and 4, the program should output</a:t>
+            </a:r>
+            <a:r>
+              <a:rPr lang="en-US" sz="1600" dirty="0" smtClean="0"/>
+              <a:t>:</a:t>
+            </a:r>
+            <a:endParaRPr lang="en-US" sz="1800" dirty="0"/>
+          </a:p>
+          <a:p>
+            <a:pPr lvl="1"/>
+            <a:endParaRPr lang="en-US" sz="1900" dirty="0" smtClean="0"/>
+          </a:p>
+          <a:p>
+            <a:pPr lvl="1"/>
+            <a:endParaRPr lang="en-US" sz="1900" dirty="0"/>
+          </a:p>
+          <a:p>
+            <a:pPr lvl="1"/>
+            <a:endParaRPr lang="en-US" sz="1900" dirty="0" smtClean="0"/>
+          </a:p>
+          <a:p>
+            <a:pPr lvl="1"/>
+            <a:endParaRPr lang="en-US" sz="1900" dirty="0"/>
+          </a:p>
+          <a:p>
+            <a:pPr lvl="1"/>
+            <a:r>
+              <a:rPr lang="en-US" sz="1900" dirty="0" smtClean="0"/>
+              <a:t>If </a:t>
+            </a:r>
+            <a:r>
+              <a:rPr lang="en-US" sz="1900" dirty="0"/>
+              <a:t>the variables hold numbers 73457 and 12888, the program output should be:</a:t>
+            </a:r>
+          </a:p>
+          <a:p>
+            <a:pPr marL="0" indent="0">
+              <a:buNone/>
+            </a:pPr>
+            <a:r>
+              <a:rPr lang="en-US" dirty="0"/>
+              <a:t/>
+            </a:r>
+            <a:br>
+              <a:rPr lang="en-US" dirty="0"/>
+            </a:br>
+            <a:endParaRPr lang="en-US" sz="1600" dirty="0"/>
+          </a:p>
+        </p:txBody>
+      </p:sp>
+      <p:sp>
+        <p:nvSpPr>
+          <p:cNvPr id="4" name="Rectangle 3"/>
+          <p:cNvSpPr/>
+          <p:nvPr/>
+        </p:nvSpPr>
+        <p:spPr>
+          <a:xfrm>
+            <a:off x="1524000" y="2362200"/>
+            <a:ext cx="5334000" cy="533400"/>
+          </a:xfrm>
+          <a:prstGeom prst="rect">
+            <a:avLst/>
+          </a:prstGeom>
+          <a:ln w="9525"/>
+        </p:spPr>
+        <p:style>
+          <a:lnRef idx="2">
+            <a:schemeClr val="dk1"/>
+          </a:lnRef>
+          <a:fillRef idx="1">
+            <a:schemeClr val="lt1"/>
+          </a:fillRef>
+          <a:effectRef idx="0">
+            <a:schemeClr val="dk1"/>
+          </a:effectRef>
+          <a:fontRef idx="minor">
+            <a:schemeClr val="dk1"/>
+          </a:fontRef>
+        </p:style>
+        <p:txBody>
+          <a:bodyPr rtlCol="0" anchor="ctr"/>
+          <a:lstStyle/>
+          <a:p>
+            <a:r>
+              <a:rPr lang="en-US" dirty="0"/>
+              <a:t>5 + 4 = 9</a:t>
+            </a:r>
+          </a:p>
+        </p:txBody>
+      </p:sp>
+      <p:sp>
+        <p:nvSpPr>
+          <p:cNvPr id="5" name="Rectangle 4"/>
+          <p:cNvSpPr/>
+          <p:nvPr/>
+        </p:nvSpPr>
+        <p:spPr>
+          <a:xfrm>
+            <a:off x="1524000" y="3562350"/>
+            <a:ext cx="5334000" cy="533400"/>
+          </a:xfrm>
+          <a:prstGeom prst="rect">
+            <a:avLst/>
+          </a:prstGeom>
+          <a:ln w="9525"/>
+        </p:spPr>
+        <p:style>
+          <a:lnRef idx="2">
+            <a:schemeClr val="dk1"/>
+          </a:lnRef>
+          <a:fillRef idx="1">
+            <a:schemeClr val="lt1"/>
+          </a:fillRef>
+          <a:effectRef idx="0">
+            <a:schemeClr val="dk1"/>
+          </a:effectRef>
+          <a:fontRef idx="minor">
+            <a:schemeClr val="dk1"/>
+          </a:fontRef>
+        </p:style>
+        <p:txBody>
+          <a:bodyPr rtlCol="0" anchor="ctr"/>
+          <a:lstStyle/>
+          <a:p>
+            <a:r>
+              <a:rPr lang="en-US" dirty="0"/>
+              <a:t>73457 + 12888 = 86345 </a:t>
+            </a:r>
+          </a:p>
+        </p:txBody>
+      </p:sp>
+    </p:spTree>
+    <p:extLst>
+      <p:ext uri="{BB962C8B-B14F-4D97-AF65-F5344CB8AC3E}">
+        <p14:creationId xmlns:p14="http://schemas.microsoft.com/office/powerpoint/2010/main" val="1869822733"/>
+      </p:ext>
+    </p:extLst>
+  </p:cSld>
+  <p:clrMapOvr>
+    <a:masterClrMapping/>
+  </p:clrMapOvr>
+  <p:timing>
+    <p:tnLst>
+      <p:par>
+        <p:cTn id="1" dur="indefinite" restart="never" nodeType="tmRoot"/>
       </p:par>
     </p:tnLst>
   </p:timing>
@@ -11280,6 +12605,226 @@
 </p:sld>
 </file>
 
+<file path=ppt/slides/slide30.xml><?xml version="1.0" encoding="utf-8"?>
+<p:sld xmlns:a="http://schemas.openxmlformats.org/drawingml/2006/main" xmlns:r="http://schemas.openxmlformats.org/officeDocument/2006/relationships" xmlns:p="http://schemas.openxmlformats.org/presentationml/2006/main">
+  <p:cSld>
+    <p:spTree>
+      <p:nvGrpSpPr>
+        <p:cNvPr id="1" name=""/>
+        <p:cNvGrpSpPr/>
+        <p:nvPr/>
+      </p:nvGrpSpPr>
+      <p:grpSpPr>
+        <a:xfrm>
+          <a:off x="0" y="0"/>
+          <a:ext cx="0" cy="0"/>
+          <a:chOff x="0" y="0"/>
+          <a:chExt cx="0" cy="0"/>
+        </a:xfrm>
+      </p:grpSpPr>
+      <p:sp>
+        <p:nvSpPr>
+          <p:cNvPr id="2" name="Title 1"/>
+          <p:cNvSpPr>
+            <a:spLocks noGrp="1"/>
+          </p:cNvSpPr>
+          <p:nvPr>
+            <p:ph type="title"/>
+          </p:nvPr>
+        </p:nvSpPr>
+        <p:spPr/>
+        <p:txBody>
+          <a:bodyPr/>
+          <a:lstStyle/>
+          <a:p>
+            <a:r>
+              <a:rPr lang="en-US" dirty="0" smtClean="0"/>
+              <a:t>Exercise 7</a:t>
+            </a:r>
+            <a:endParaRPr lang="en-US" dirty="0"/>
+          </a:p>
+        </p:txBody>
+      </p:sp>
+      <p:sp>
+        <p:nvSpPr>
+          <p:cNvPr id="3" name="Content Placeholder 2"/>
+          <p:cNvSpPr>
+            <a:spLocks noGrp="1"/>
+          </p:cNvSpPr>
+          <p:nvPr>
+            <p:ph idx="1"/>
+          </p:nvPr>
+        </p:nvSpPr>
+        <p:spPr/>
+        <p:txBody>
+          <a:bodyPr>
+            <a:normAutofit fontScale="85000" lnSpcReduction="10000"/>
+          </a:bodyPr>
+          <a:lstStyle/>
+          <a:p>
+            <a:r>
+              <a:rPr lang="en-US" sz="1800" dirty="0" smtClean="0"/>
+              <a:t>Multiplication</a:t>
+            </a:r>
+          </a:p>
+          <a:p>
+            <a:pPr lvl="1"/>
+            <a:r>
+              <a:rPr lang="en-US" sz="1900" dirty="0"/>
+              <a:t>Create a program similar to the previous one except that it multiplies the two numbers instead of adding them</a:t>
+            </a:r>
+            <a:r>
+              <a:rPr lang="en-US" sz="1900" dirty="0" smtClean="0"/>
+              <a:t>.</a:t>
+            </a:r>
+          </a:p>
+          <a:p>
+            <a:pPr lvl="1"/>
+            <a:r>
+              <a:rPr lang="en-US" sz="1900" dirty="0"/>
+              <a:t>For example, if the variables hold numbers 2 and 8, the program output should be:</a:t>
+            </a:r>
+          </a:p>
+          <a:p>
+            <a:pPr marL="0" indent="0">
+              <a:buNone/>
+            </a:pPr>
+            <a:endParaRPr lang="en-US" dirty="0" smtClean="0"/>
+          </a:p>
+          <a:p>
+            <a:pPr marL="0" indent="0">
+              <a:buNone/>
+            </a:pPr>
+            <a:endParaRPr lang="en-US" sz="1900" dirty="0"/>
+          </a:p>
+          <a:p>
+            <a:pPr lvl="1"/>
+            <a:r>
+              <a:rPr lang="en-US" sz="1900" dirty="0"/>
+              <a:t>If the variables hold numbers 277 and 111, the program output should be:</a:t>
+            </a:r>
+          </a:p>
+          <a:p>
+            <a:pPr lvl="1"/>
+            <a:endParaRPr lang="en-US" sz="1900" dirty="0"/>
+          </a:p>
+          <a:p>
+            <a:pPr marL="0" indent="0">
+              <a:buNone/>
+            </a:pPr>
+            <a:r>
+              <a:rPr lang="en-US" dirty="0" smtClean="0"/>
+              <a:t/>
+            </a:r>
+            <a:br>
+              <a:rPr lang="en-US" dirty="0" smtClean="0"/>
+            </a:br>
+            <a:endParaRPr lang="en-US" sz="1600" dirty="0"/>
+          </a:p>
+        </p:txBody>
+      </p:sp>
+      <p:sp>
+        <p:nvSpPr>
+          <p:cNvPr id="4" name="Rectangle 3"/>
+          <p:cNvSpPr/>
+          <p:nvPr/>
+        </p:nvSpPr>
+        <p:spPr>
+          <a:xfrm>
+            <a:off x="1543050" y="2305050"/>
+            <a:ext cx="5334000" cy="533400"/>
+          </a:xfrm>
+          <a:prstGeom prst="rect">
+            <a:avLst/>
+          </a:prstGeom>
+          <a:ln w="9525"/>
+        </p:spPr>
+        <p:style>
+          <a:lnRef idx="2">
+            <a:schemeClr val="dk1"/>
+          </a:lnRef>
+          <a:fillRef idx="1">
+            <a:schemeClr val="lt1"/>
+          </a:fillRef>
+          <a:effectRef idx="0">
+            <a:schemeClr val="dk1"/>
+          </a:effectRef>
+          <a:fontRef idx="minor">
+            <a:schemeClr val="dk1"/>
+          </a:fontRef>
+        </p:style>
+        <p:txBody>
+          <a:bodyPr rtlCol="0" anchor="ctr"/>
+          <a:lstStyle/>
+          <a:p>
+            <a:r>
+              <a:rPr lang="en-US" dirty="0"/>
+              <a:t>2 * 8 = 16</a:t>
+            </a:r>
+          </a:p>
+        </p:txBody>
+      </p:sp>
+      <p:sp>
+        <p:nvSpPr>
+          <p:cNvPr id="5" name="Rectangle 4"/>
+          <p:cNvSpPr/>
+          <p:nvPr/>
+        </p:nvSpPr>
+        <p:spPr>
+          <a:xfrm>
+            <a:off x="1524000" y="3409950"/>
+            <a:ext cx="5334000" cy="533400"/>
+          </a:xfrm>
+          <a:prstGeom prst="rect">
+            <a:avLst/>
+          </a:prstGeom>
+          <a:ln w="9525"/>
+        </p:spPr>
+        <p:style>
+          <a:lnRef idx="2">
+            <a:schemeClr val="dk1"/>
+          </a:lnRef>
+          <a:fillRef idx="1">
+            <a:schemeClr val="lt1"/>
+          </a:fillRef>
+          <a:effectRef idx="0">
+            <a:schemeClr val="dk1"/>
+          </a:effectRef>
+          <a:fontRef idx="minor">
+            <a:schemeClr val="dk1"/>
+          </a:fontRef>
+        </p:style>
+        <p:txBody>
+          <a:bodyPr rtlCol="0" anchor="ctr"/>
+          <a:lstStyle/>
+          <a:p>
+            <a:r>
+              <a:rPr lang="en-US" dirty="0"/>
+              <a:t>277 * 111 = 30747 </a:t>
+            </a:r>
+          </a:p>
+        </p:txBody>
+      </p:sp>
+    </p:spTree>
+    <p:extLst>
+      <p:ext uri="{BB962C8B-B14F-4D97-AF65-F5344CB8AC3E}">
+        <p14:creationId xmlns:p14="http://schemas.microsoft.com/office/powerpoint/2010/main" val="3328490062"/>
+      </p:ext>
+    </p:extLst>
+  </p:cSld>
+  <p:clrMapOvr>
+    <a:masterClrMapping/>
+  </p:clrMapOvr>
+  <p:timing>
+    <p:tnLst>
+      <p:par>
+        <p:cTn id="1" dur="indefinite" restart="never" nodeType="tmRoot"/>
+      </p:par>
+    </p:tnLst>
+  </p:timing>
+</p:sld>
+</file>
+
 <file path=ppt/slides/slide4.xml><?xml version="1.0" encoding="utf-8"?>
 <p:sld xmlns:a="http://schemas.openxmlformats.org/drawingml/2006/main" xmlns:r="http://schemas.openxmlformats.org/officeDocument/2006/relationships" xmlns:p="http://schemas.openxmlformats.org/presentationml/2006/main">
   <p:cSld>

</xml_diff>